<commit_message>
reporte de monitoreo actualizado por nuevametrica
</commit_message>
<xml_diff>
--- a/Organización/Métricas y monitoreo/PTL_Reporte_monitoreo.pptx
+++ b/Organización/Métricas y monitoreo/PTL_Reporte_monitoreo.pptx
@@ -15,8 +15,8 @@
     <p:sldId id="265" r:id="rId9"/>
     <p:sldId id="266" r:id="rId10"/>
     <p:sldId id="267" r:id="rId11"/>
-    <p:sldId id="269" r:id="rId12"/>
-    <p:sldId id="268" r:id="rId13"/>
+    <p:sldId id="270" r:id="rId12"/>
+    <p:sldId id="269" r:id="rId13"/>
   </p:sldIdLst>
   <p:sldSz cx="9144000" cy="6858000" type="screen4x3"/>
   <p:notesSz cx="7772400" cy="10058400"/>
@@ -364,7 +364,7 @@
           <a:p>
             <a:fld id="{564CF2E0-CCC4-4E1E-9902-C3C36AB3FDA4}" type="datetimeFigureOut">
               <a:rPr lang="en-US" smtClean="0"/>
-              <a:t>9/15/2015</a:t>
+              <a:t>10/6/2015</a:t>
             </a:fld>
             <a:endParaRPr lang="en-US"/>
           </a:p>
@@ -581,7 +581,7 @@
           <a:p>
             <a:fld id="{564CF2E0-CCC4-4E1E-9902-C3C36AB3FDA4}" type="datetimeFigureOut">
               <a:rPr lang="en-US" smtClean="0"/>
-              <a:t>9/15/2015</a:t>
+              <a:t>10/6/2015</a:t>
             </a:fld>
             <a:endParaRPr lang="en-US"/>
           </a:p>
@@ -756,7 +756,7 @@
           <a:p>
             <a:fld id="{564CF2E0-CCC4-4E1E-9902-C3C36AB3FDA4}" type="datetimeFigureOut">
               <a:rPr lang="en-US" smtClean="0"/>
-              <a:t>9/15/2015</a:t>
+              <a:t>10/6/2015</a:t>
             </a:fld>
             <a:endParaRPr lang="en-US"/>
           </a:p>
@@ -921,7 +921,7 @@
           <a:p>
             <a:fld id="{564CF2E0-CCC4-4E1E-9902-C3C36AB3FDA4}" type="datetimeFigureOut">
               <a:rPr lang="en-US" smtClean="0"/>
-              <a:t>9/15/2015</a:t>
+              <a:t>10/6/2015</a:t>
             </a:fld>
             <a:endParaRPr lang="en-US"/>
           </a:p>
@@ -1205,7 +1205,7 @@
           <a:p>
             <a:fld id="{564CF2E0-CCC4-4E1E-9902-C3C36AB3FDA4}" type="datetimeFigureOut">
               <a:rPr lang="en-US" smtClean="0"/>
-              <a:t>9/15/2015</a:t>
+              <a:t>10/6/2015</a:t>
             </a:fld>
             <a:endParaRPr lang="en-US"/>
           </a:p>
@@ -1531,7 +1531,7 @@
           <a:p>
             <a:fld id="{564CF2E0-CCC4-4E1E-9902-C3C36AB3FDA4}" type="datetimeFigureOut">
               <a:rPr lang="en-US" smtClean="0"/>
-              <a:t>9/15/2015</a:t>
+              <a:t>10/6/2015</a:t>
             </a:fld>
             <a:endParaRPr lang="en-US"/>
           </a:p>
@@ -1956,7 +1956,7 @@
           <a:p>
             <a:fld id="{564CF2E0-CCC4-4E1E-9902-C3C36AB3FDA4}" type="datetimeFigureOut">
               <a:rPr lang="en-US" smtClean="0"/>
-              <a:t>9/15/2015</a:t>
+              <a:t>10/6/2015</a:t>
             </a:fld>
             <a:endParaRPr lang="en-US"/>
           </a:p>
@@ -2129,7 +2129,7 @@
           <a:p>
             <a:fld id="{564CF2E0-CCC4-4E1E-9902-C3C36AB3FDA4}" type="datetimeFigureOut">
               <a:rPr lang="en-US" smtClean="0"/>
-              <a:t>9/15/2015</a:t>
+              <a:t>10/6/2015</a:t>
             </a:fld>
             <a:endParaRPr lang="en-US"/>
           </a:p>
@@ -2219,7 +2219,7 @@
           <a:p>
             <a:fld id="{564CF2E0-CCC4-4E1E-9902-C3C36AB3FDA4}" type="datetimeFigureOut">
               <a:rPr lang="en-US" smtClean="0"/>
-              <a:t>9/15/2015</a:t>
+              <a:t>10/6/2015</a:t>
             </a:fld>
             <a:endParaRPr lang="en-US"/>
           </a:p>
@@ -2499,7 +2499,7 @@
           <a:p>
             <a:fld id="{564CF2E0-CCC4-4E1E-9902-C3C36AB3FDA4}" type="datetimeFigureOut">
               <a:rPr lang="en-US" smtClean="0"/>
-              <a:t>9/15/2015</a:t>
+              <a:t>10/6/2015</a:t>
             </a:fld>
             <a:endParaRPr lang="en-US"/>
           </a:p>
@@ -2798,7 +2798,7 @@
           <a:p>
             <a:fld id="{564CF2E0-CCC4-4E1E-9902-C3C36AB3FDA4}" type="datetimeFigureOut">
               <a:rPr lang="en-US" smtClean="0"/>
-              <a:t>9/15/2015</a:t>
+              <a:t>10/6/2015</a:t>
             </a:fld>
             <a:endParaRPr lang="en-US"/>
           </a:p>
@@ -3009,7 +3009,7 @@
             <a:fld id="{75D48070-6A81-47D0-9810-1540B9FEFF61}" type="datetime1">
               <a:rPr lang="en-US" smtClean="0"/>
               <a:pPr/>
-              <a:t>9/15/2015</a:t>
+              <a:t>10/6/2015</a:t>
             </a:fld>
             <a:endParaRPr lang="en-US"/>
           </a:p>
@@ -3809,13 +3809,22 @@
               </a:lnSpc>
             </a:pPr>
             <a:r>
+              <a:rPr lang="es-MX" sz="4400" dirty="0">
+                <a:solidFill>
+                  <a:srgbClr val="000000"/>
+                </a:solidFill>
+                <a:latin typeface="Calibri"/>
+              </a:rPr>
+              <a:t>V</a:t>
+            </a:r>
+            <a:r>
               <a:rPr lang="es-MX" sz="4400" dirty="0" smtClean="0">
                 <a:solidFill>
                   <a:srgbClr val="000000"/>
                 </a:solidFill>
                 <a:latin typeface="Calibri"/>
               </a:rPr>
-              <a:t>Índice de Satisfacción</a:t>
+              <a:t>entas</a:t>
             </a:r>
             <a:endParaRPr dirty="0"/>
           </a:p>
@@ -3859,23 +3868,47 @@
         </p:nvSpPr>
         <p:spPr>
           <a:xfrm>
-            <a:off x="2286000" y="2828836"/>
-            <a:ext cx="4572000" cy="1200329"/>
+            <a:off x="6890645" y="1124744"/>
+            <a:ext cx="1853952" cy="3416320"/>
           </a:xfrm>
           <a:prstGeom prst="rect">
             <a:avLst/>
           </a:prstGeom>
         </p:spPr>
         <p:txBody>
-          <a:bodyPr>
+          <a:bodyPr wrap="square">
             <a:spAutoFit/>
           </a:bodyPr>
           <a:lstStyle/>
           <a:p>
             <a:r>
               <a:rPr lang="es-MX" dirty="0"/>
-              <a:t>&lt;Ingresa las graficas obtenidas como resultados en concentrado de métricas y una breve descripción explicando resultados.&gt;</a:t>
-            </a:r>
+              <a:t>&lt;Ingresa las graficas obtenidas </a:t>
+            </a:r>
+            <a:r>
+              <a:rPr lang="es-MX" dirty="0" smtClean="0"/>
+              <a:t>para las ventas quincenales y por empleado, además de una </a:t>
+            </a:r>
+            <a:r>
+              <a:rPr lang="es-MX" dirty="0"/>
+              <a:t>breve descripción explicando resultados</a:t>
+            </a:r>
+            <a:r>
+              <a:rPr lang="es-MX" dirty="0" smtClean="0"/>
+              <a:t>.&gt;</a:t>
+            </a:r>
+          </a:p>
+          <a:p>
+            <a:endParaRPr lang="es-MX" dirty="0"/>
+          </a:p>
+          <a:p>
+            <a:r>
+              <a:rPr lang="es-MX" dirty="0"/>
+              <a:t>Análisis: </a:t>
+            </a:r>
+          </a:p>
+          <a:p>
+            <a:endParaRPr lang="es-MX" dirty="0"/>
           </a:p>
         </p:txBody>
       </p:sp>
@@ -3962,15 +3995,15 @@
               </a:lnSpc>
             </a:pPr>
             <a:r>
-              <a:rPr lang="es-MX" sz="4400">
+              <a:rPr lang="es-MX" sz="4400" dirty="0" smtClean="0">
                 <a:solidFill>
                   <a:srgbClr val="000000"/>
                 </a:solidFill>
                 <a:latin typeface="Calibri"/>
               </a:rPr>
-              <a:t>Riesgos</a:t>
-            </a:r>
-            <a:endParaRPr/>
+              <a:t>Índice de Satisfacción</a:t>
+            </a:r>
+            <a:endParaRPr dirty="0"/>
           </a:p>
         </p:txBody>
       </p:sp>
@@ -3997,8 +4030,10 @@
               <a:lnSpc>
                 <a:spcPct val="100000"/>
               </a:lnSpc>
+              <a:buFont typeface="Arial"/>
+              <a:buChar char="•"/>
             </a:pPr>
-            <a:endParaRPr dirty="0"/>
+            <a:endParaRPr lang="es-MX" sz="3200" dirty="0"/>
           </a:p>
         </p:txBody>
       </p:sp>
@@ -4010,23 +4045,38 @@
         </p:nvSpPr>
         <p:spPr>
           <a:xfrm>
-            <a:off x="2286000" y="2828836"/>
-            <a:ext cx="4572000" cy="646331"/>
+            <a:off x="5751288" y="1412583"/>
+            <a:ext cx="2934072" cy="2308324"/>
           </a:xfrm>
           <a:prstGeom prst="rect">
             <a:avLst/>
           </a:prstGeom>
         </p:spPr>
         <p:txBody>
-          <a:bodyPr>
+          <a:bodyPr wrap="square">
             <a:spAutoFit/>
           </a:bodyPr>
           <a:lstStyle/>
           <a:p>
             <a:r>
+              <a:rPr lang="es-MX" dirty="0"/>
+              <a:t>&lt;Ingresa las graficas obtenidas como resultados en concentrado de métricas y una breve descripción explicando resultados</a:t>
+            </a:r>
+            <a:r>
               <a:rPr lang="es-MX" dirty="0" smtClean="0"/>
-              <a:t>&lt;Lista los riesgos monitoreados y las acciones o avances sobre ellos&gt;</a:t>
-            </a:r>
+              <a:t>.&gt;</a:t>
+            </a:r>
+          </a:p>
+          <a:p>
+            <a:endParaRPr lang="es-MX" dirty="0"/>
+          </a:p>
+          <a:p>
+            <a:r>
+              <a:rPr lang="es-MX" dirty="0"/>
+              <a:t>Análisis: </a:t>
+            </a:r>
+          </a:p>
+          <a:p>
             <a:endParaRPr lang="es-MX" dirty="0"/>
           </a:p>
         </p:txBody>
@@ -4034,7 +4084,7 @@
     </p:spTree>
     <p:extLst>
       <p:ext uri="{BB962C8B-B14F-4D97-AF65-F5344CB8AC3E}">
-        <p14:creationId xmlns:p14="http://schemas.microsoft.com/office/powerpoint/2010/main" val="136734961"/>
+        <p14:creationId xmlns:p14="http://schemas.microsoft.com/office/powerpoint/2010/main" val="4072551524"/>
       </p:ext>
     </p:extLst>
   </p:cSld>
@@ -4096,7 +4146,7 @@
       </p:grpSpPr>
       <p:sp>
         <p:nvSpPr>
-          <p:cNvPr id="93" name="CustomShape 1"/>
+          <p:cNvPr id="91" name="CustomShape 1"/>
           <p:cNvSpPr/>
           <p:nvPr/>
         </p:nvSpPr>
@@ -4125,7 +4175,7 @@
                 </a:solidFill>
                 <a:latin typeface="Calibri"/>
               </a:rPr>
-              <a:t>Respaldos</a:t>
+              <a:t>Riesgos</a:t>
             </a:r>
             <a:endParaRPr/>
           </a:p>
@@ -4133,7 +4183,7 @@
       </p:sp>
       <p:sp>
         <p:nvSpPr>
-          <p:cNvPr id="94" name="CustomShape 2"/>
+          <p:cNvPr id="92" name="CustomShape 2"/>
           <p:cNvSpPr/>
           <p:nvPr/>
         </p:nvSpPr>
@@ -4154,8 +4204,6 @@
               <a:lnSpc>
                 <a:spcPct val="100000"/>
               </a:lnSpc>
-              <a:buFont typeface="Arial"/>
-              <a:buChar char="•"/>
             </a:pPr>
             <a:endParaRPr dirty="0"/>
           </a:p>
@@ -4184,13 +4232,25 @@
           <a:p>
             <a:r>
               <a:rPr lang="es-MX" dirty="0" smtClean="0"/>
-              <a:t>&lt;Detalla los días que se generaron respaldos y donde están almacenados&gt;</a:t>
-            </a:r>
-            <a:endParaRPr lang="es-MX" dirty="0"/>
+              <a:t>&lt;Lista los riesgos monitoreados y las acciones o avances sobre </a:t>
+            </a:r>
+            <a:r>
+              <a:rPr lang="es-MX" smtClean="0"/>
+              <a:t>ellos</a:t>
+            </a:r>
+            <a:r>
+              <a:rPr lang="es-MX" smtClean="0"/>
+              <a:t>&gt;</a:t>
+            </a:r>
           </a:p>
         </p:txBody>
       </p:sp>
     </p:spTree>
+    <p:extLst>
+      <p:ext uri="{BB962C8B-B14F-4D97-AF65-F5344CB8AC3E}">
+        <p14:creationId xmlns:p14="http://schemas.microsoft.com/office/powerpoint/2010/main" val="136734961"/>
+      </p:ext>
+    </p:extLst>
   </p:cSld>
   <p:clrMapOvr>
     <a:masterClrMapping/>
@@ -4741,7 +4801,7 @@
         <p:spPr>
           <a:xfrm>
             <a:off x="5220072" y="1416240"/>
-            <a:ext cx="3168352" cy="1754326"/>
+            <a:ext cx="3168352" cy="2308324"/>
           </a:xfrm>
           <a:prstGeom prst="rect">
             <a:avLst/>
@@ -4756,8 +4816,22 @@
           <a:p>
             <a:r>
               <a:rPr lang="es-MX" dirty="0" smtClean="0"/>
-              <a:t>&lt;Ingresa las graficas obtenidas como resultados en concentrado de métricas y una breve descripción explicando resultados.&gt;</a:t>
-            </a:r>
+              <a:t>&lt;Ingresa las graficas obtenidas como resultados en concentrado de métricas y una breve descripción explicando resultados</a:t>
+            </a:r>
+            <a:r>
+              <a:rPr lang="es-MX" dirty="0" smtClean="0"/>
+              <a:t>.&gt;</a:t>
+            </a:r>
+          </a:p>
+          <a:p>
+            <a:endParaRPr lang="es-MX" dirty="0"/>
+          </a:p>
+          <a:p>
+            <a:r>
+              <a:rPr lang="es-MX" dirty="0" smtClean="0"/>
+              <a:t>Análisis: </a:t>
+            </a:r>
+            <a:endParaRPr lang="es-MX" dirty="0" smtClean="0"/>
           </a:p>
           <a:p>
             <a:endParaRPr lang="es-MX" dirty="0"/>
@@ -4895,23 +4969,34 @@
         </p:nvSpPr>
         <p:spPr>
           <a:xfrm>
-            <a:off x="2286000" y="2828836"/>
-            <a:ext cx="4572000" cy="1200329"/>
+            <a:off x="5868144" y="1340768"/>
+            <a:ext cx="3078088" cy="1754326"/>
           </a:xfrm>
           <a:prstGeom prst="rect">
             <a:avLst/>
           </a:prstGeom>
         </p:spPr>
         <p:txBody>
-          <a:bodyPr>
+          <a:bodyPr wrap="square">
             <a:spAutoFit/>
           </a:bodyPr>
           <a:lstStyle/>
           <a:p>
             <a:r>
               <a:rPr lang="es-MX" dirty="0"/>
-              <a:t>&lt;Ingresa las graficas obtenidas como resultados en concentrado de métricas y una breve descripción explicando resultados.&gt;</a:t>
-            </a:r>
+              <a:t>&lt;Ingresa las graficas obtenidas como resultados en concentrado de métricas y una breve descripción explicando resultados</a:t>
+            </a:r>
+            <a:r>
+              <a:rPr lang="es-MX" dirty="0" smtClean="0"/>
+              <a:t>.&gt;</a:t>
+            </a:r>
+          </a:p>
+          <a:p>
+            <a:r>
+              <a:rPr lang="es-MX" dirty="0" smtClean="0"/>
+              <a:t>Análisis: </a:t>
+            </a:r>
+            <a:endParaRPr lang="es-MX" dirty="0"/>
           </a:p>
         </p:txBody>
       </p:sp>
@@ -5046,23 +5131,39 @@
         </p:nvSpPr>
         <p:spPr>
           <a:xfrm>
-            <a:off x="2286000" y="2828836"/>
-            <a:ext cx="4572000" cy="1200329"/>
+            <a:off x="6365104" y="1124744"/>
+            <a:ext cx="2286720" cy="3139321"/>
           </a:xfrm>
           <a:prstGeom prst="rect">
             <a:avLst/>
           </a:prstGeom>
         </p:spPr>
         <p:txBody>
-          <a:bodyPr>
+          <a:bodyPr wrap="square">
             <a:spAutoFit/>
           </a:bodyPr>
           <a:lstStyle/>
           <a:p>
             <a:r>
               <a:rPr lang="es-MX" dirty="0"/>
-              <a:t>&lt;Ingresa las graficas obtenidas como resultados en concentrado de métricas y una breve descripción explicando resultados.&gt;</a:t>
-            </a:r>
+              <a:t>&lt;Ingresa las graficas obtenidas como resultados en concentrado de métricas y una breve descripción explicando resultados</a:t>
+            </a:r>
+            <a:r>
+              <a:rPr lang="es-MX" dirty="0" smtClean="0"/>
+              <a:t>.&gt;</a:t>
+            </a:r>
+          </a:p>
+          <a:p>
+            <a:endParaRPr lang="es-MX" dirty="0"/>
+          </a:p>
+          <a:p>
+            <a:r>
+              <a:rPr lang="es-MX" dirty="0"/>
+              <a:t>Análisis: </a:t>
+            </a:r>
+          </a:p>
+          <a:p>
+            <a:endParaRPr lang="es-MX" dirty="0"/>
           </a:p>
         </p:txBody>
       </p:sp>
@@ -5197,23 +5298,42 @@
         </p:nvSpPr>
         <p:spPr>
           <a:xfrm>
-            <a:off x="2286000" y="2828836"/>
-            <a:ext cx="4572000" cy="1200329"/>
+            <a:off x="6183336" y="1416240"/>
+            <a:ext cx="2502024" cy="2862322"/>
           </a:xfrm>
           <a:prstGeom prst="rect">
             <a:avLst/>
           </a:prstGeom>
         </p:spPr>
         <p:txBody>
-          <a:bodyPr>
+          <a:bodyPr wrap="square">
             <a:spAutoFit/>
           </a:bodyPr>
           <a:lstStyle/>
           <a:p>
             <a:r>
               <a:rPr lang="es-MX" dirty="0"/>
-              <a:t>&lt;Ingresa las graficas obtenidas como resultados en concentrado de métricas y una breve descripción explicando resultados.&gt;</a:t>
-            </a:r>
+              <a:t>&lt;Ingresa las graficas obtenidas como resultados en concentrado de métricas y una breve descripción explicando resultados</a:t>
+            </a:r>
+            <a:r>
+              <a:rPr lang="es-MX" dirty="0" smtClean="0"/>
+              <a:t>.&gt;</a:t>
+            </a:r>
+          </a:p>
+          <a:p>
+            <a:r>
+              <a:rPr lang="es-MX" dirty="0"/>
+              <a:t>Análisis: </a:t>
+            </a:r>
+          </a:p>
+          <a:p>
+            <a:endParaRPr lang="es-MX" dirty="0"/>
+          </a:p>
+          <a:p>
+            <a:endParaRPr lang="es-MX" dirty="0"/>
+          </a:p>
+          <a:p>
+            <a:endParaRPr lang="es-MX" dirty="0"/>
           </a:p>
         </p:txBody>
       </p:sp>
@@ -5348,23 +5468,39 @@
         </p:nvSpPr>
         <p:spPr>
           <a:xfrm>
-            <a:off x="2286000" y="2828836"/>
-            <a:ext cx="4572000" cy="1200329"/>
+            <a:off x="6376045" y="1416240"/>
+            <a:ext cx="2286720" cy="3139321"/>
           </a:xfrm>
           <a:prstGeom prst="rect">
             <a:avLst/>
           </a:prstGeom>
         </p:spPr>
         <p:txBody>
-          <a:bodyPr>
+          <a:bodyPr wrap="square">
             <a:spAutoFit/>
           </a:bodyPr>
           <a:lstStyle/>
           <a:p>
             <a:r>
               <a:rPr lang="es-MX" dirty="0"/>
-              <a:t>&lt;Ingresa las graficas obtenidas como resultados en concentrado de métricas y una breve descripción explicando resultados.&gt;</a:t>
-            </a:r>
+              <a:t>&lt;Ingresa las graficas obtenidas como resultados en concentrado de métricas y una breve descripción explicando resultados</a:t>
+            </a:r>
+            <a:r>
+              <a:rPr lang="es-MX" dirty="0" smtClean="0"/>
+              <a:t>.&gt;</a:t>
+            </a:r>
+          </a:p>
+          <a:p>
+            <a:endParaRPr lang="es-MX" dirty="0"/>
+          </a:p>
+          <a:p>
+            <a:r>
+              <a:rPr lang="es-MX" dirty="0"/>
+              <a:t>Análisis: </a:t>
+            </a:r>
+          </a:p>
+          <a:p>
+            <a:endParaRPr lang="es-MX" dirty="0"/>
           </a:p>
         </p:txBody>
       </p:sp>
@@ -5499,23 +5635,39 @@
         </p:nvSpPr>
         <p:spPr>
           <a:xfrm>
-            <a:off x="2286000" y="2828836"/>
-            <a:ext cx="4572000" cy="1200329"/>
+            <a:off x="6041877" y="1416240"/>
+            <a:ext cx="2646040" cy="2585323"/>
           </a:xfrm>
           <a:prstGeom prst="rect">
             <a:avLst/>
           </a:prstGeom>
         </p:spPr>
         <p:txBody>
-          <a:bodyPr>
+          <a:bodyPr wrap="square">
             <a:spAutoFit/>
           </a:bodyPr>
           <a:lstStyle/>
           <a:p>
             <a:r>
               <a:rPr lang="es-MX" dirty="0"/>
-              <a:t>&lt;Ingresa las graficas obtenidas como resultados en concentrado de métricas y una breve descripción explicando resultados.&gt;</a:t>
-            </a:r>
+              <a:t>&lt;Ingresa las graficas obtenidas como resultados en concentrado de métricas y una breve descripción explicando resultados</a:t>
+            </a:r>
+            <a:r>
+              <a:rPr lang="es-MX" dirty="0" smtClean="0"/>
+              <a:t>.&gt;</a:t>
+            </a:r>
+          </a:p>
+          <a:p>
+            <a:endParaRPr lang="es-MX" dirty="0"/>
+          </a:p>
+          <a:p>
+            <a:r>
+              <a:rPr lang="es-MX" dirty="0"/>
+              <a:t>Análisis: </a:t>
+            </a:r>
+          </a:p>
+          <a:p>
+            <a:endParaRPr lang="es-MX" dirty="0"/>
           </a:p>
         </p:txBody>
       </p:sp>

</xml_diff>

<commit_message>
Version plantilla de reporte de monitoreo
</commit_message>
<xml_diff>
--- a/Organización/Métricas y monitoreo/PTL_Reporte_monitoreo.pptx
+++ b/Organización/Métricas y monitoreo/PTL_Reporte_monitoreo.pptx
@@ -16,6 +16,7 @@
     <p:sldId id="264" r:id="rId11"/>
     <p:sldId id="265" r:id="rId12"/>
     <p:sldId id="266" r:id="rId13"/>
+    <p:sldId id="267" r:id="rId14"/>
   </p:sldIdLst>
   <p:sldSz cx="9144000" cy="6858000"/>
   <p:notesSz cx="7772400" cy="10058400"/>
@@ -1212,7 +1213,7 @@
         <p:spPr>
           <a:xfrm>
             <a:off x="777240" y="0"/>
-            <a:ext cx="7543080" cy="380160"/>
+            <a:ext cx="7542720" cy="379800"/>
           </a:xfrm>
           <a:prstGeom prst="rect">
             <a:avLst/>
@@ -1245,7 +1246,7 @@
         <p:spPr>
           <a:xfrm>
             <a:off x="777240" y="6172200"/>
-            <a:ext cx="7543080" cy="26640"/>
+            <a:ext cx="7542720" cy="26280"/>
           </a:xfrm>
           <a:prstGeom prst="rect">
             <a:avLst/>
@@ -1296,7 +1297,7 @@
               <a:rPr lang="es-MX" sz="4400">
                 <a:latin typeface="Arial"/>
               </a:rPr>
-              <a:t>Pulse para editar el formato del texto de título</a:t>
+              <a:t>Click to edit the title text format</a:t>
             </a:r>
             <a:endParaRPr/>
           </a:p>
@@ -1333,7 +1334,7 @@
               <a:rPr lang="es-MX" sz="3200">
                 <a:latin typeface="Arial"/>
               </a:rPr>
-              <a:t>Pulse para editar el formato de esquema del texto</a:t>
+              <a:t>Click to edit the outline text format</a:t>
             </a:r>
             <a:endParaRPr/>
           </a:p>
@@ -1347,7 +1348,7 @@
               <a:rPr lang="es-MX" sz="2800">
                 <a:latin typeface="Arial"/>
               </a:rPr>
-              <a:t>Segundo nivel del esquema</a:t>
+              <a:t>Second Outline Level</a:t>
             </a:r>
             <a:endParaRPr/>
           </a:p>
@@ -1361,7 +1362,7 @@
               <a:rPr lang="es-MX" sz="2400">
                 <a:latin typeface="Arial"/>
               </a:rPr>
-              <a:t>Tercer nivel del esquema</a:t>
+              <a:t>Third Outline Level</a:t>
             </a:r>
             <a:endParaRPr/>
           </a:p>
@@ -1375,7 +1376,7 @@
               <a:rPr lang="es-MX" sz="2000">
                 <a:latin typeface="Arial"/>
               </a:rPr>
-              <a:t>Cuarto nivel del esquema</a:t>
+              <a:t>Fourth Outline Level</a:t>
             </a:r>
             <a:endParaRPr/>
           </a:p>
@@ -1389,7 +1390,7 @@
               <a:rPr lang="es-MX" sz="2000">
                 <a:latin typeface="Arial"/>
               </a:rPr>
-              <a:t>Quinto nivel del esquema</a:t>
+              <a:t>Fifth Outline Level</a:t>
             </a:r>
             <a:endParaRPr/>
           </a:p>
@@ -1403,7 +1404,7 @@
               <a:rPr lang="es-MX" sz="2000">
                 <a:latin typeface="Arial"/>
               </a:rPr>
-              <a:t>Sexto nivel del esquema</a:t>
+              <a:t>Sixth Outline Level</a:t>
             </a:r>
             <a:endParaRPr/>
           </a:p>
@@ -1417,7 +1418,7 @@
               <a:rPr lang="es-MX" sz="2000">
                 <a:latin typeface="Arial"/>
               </a:rPr>
-              <a:t>Séptimo nivel del esquema</a:t>
+              <a:t>Seventh Outline Level</a:t>
             </a:r>
             <a:endParaRPr/>
           </a:p>
@@ -1469,7 +1470,7 @@
         <p:spPr>
           <a:xfrm>
             <a:off x="1012680" y="2282760"/>
-            <a:ext cx="7770240" cy="1467720"/>
+            <a:ext cx="7769880" cy="1467360"/>
           </a:xfrm>
           <a:prstGeom prst="rect">
             <a:avLst/>
@@ -1495,7 +1496,7 @@
         <p:spPr>
           <a:xfrm>
             <a:off x="457200" y="501840"/>
-            <a:ext cx="8031960" cy="1143360"/>
+            <a:ext cx="8031600" cy="1143000"/>
           </a:xfrm>
           <a:prstGeom prst="rect">
             <a:avLst/>
@@ -1542,7 +1543,7 @@
         <p:spPr>
           <a:xfrm>
             <a:off x="457200" y="1604520"/>
-            <a:ext cx="3924720" cy="3975840"/>
+            <a:ext cx="3924360" cy="3975480"/>
           </a:xfrm>
           <a:prstGeom prst="rect">
             <a:avLst/>
@@ -1657,7 +1658,7 @@
         <p:spPr>
           <a:xfrm>
             <a:off x="6948360" y="1196640"/>
-            <a:ext cx="1913760" cy="1894680"/>
+            <a:ext cx="1913400" cy="1894320"/>
           </a:xfrm>
           <a:prstGeom prst="rect">
             <a:avLst/>
@@ -1735,7 +1736,7 @@
         <p:spPr>
           <a:xfrm>
             <a:off x="457200" y="274680"/>
-            <a:ext cx="8227440" cy="1140840"/>
+            <a:ext cx="8227080" cy="1140480"/>
           </a:xfrm>
           <a:prstGeom prst="rect">
             <a:avLst/>
@@ -1782,7 +1783,7 @@
         <p:spPr>
           <a:xfrm>
             <a:off x="457200" y="1600200"/>
-            <a:ext cx="8227440" cy="4523760"/>
+            <a:ext cx="8227080" cy="4523400"/>
           </a:xfrm>
           <a:prstGeom prst="rect">
             <a:avLst/>
@@ -1808,7 +1809,7 @@
         <p:spPr>
           <a:xfrm>
             <a:off x="6890760" y="1124640"/>
-            <a:ext cx="1853280" cy="3381840"/>
+            <a:ext cx="1852920" cy="3381480"/>
           </a:xfrm>
           <a:prstGeom prst="rect">
             <a:avLst/>
@@ -1948,7 +1949,7 @@
         <p:spPr>
           <a:xfrm>
             <a:off x="457200" y="274680"/>
-            <a:ext cx="8227440" cy="1140840"/>
+            <a:ext cx="8227080" cy="1140480"/>
           </a:xfrm>
           <a:prstGeom prst="rect">
             <a:avLst/>
@@ -1995,7 +1996,7 @@
         <p:spPr>
           <a:xfrm>
             <a:off x="457200" y="1600200"/>
-            <a:ext cx="8227440" cy="4523760"/>
+            <a:ext cx="8227080" cy="4523400"/>
           </a:xfrm>
           <a:prstGeom prst="rect">
             <a:avLst/>
@@ -2021,7 +2022,7 @@
         <p:spPr>
           <a:xfrm>
             <a:off x="5751360" y="1412640"/>
-            <a:ext cx="2933280" cy="2284560"/>
+            <a:ext cx="2932920" cy="2284200"/>
           </a:xfrm>
           <a:prstGeom prst="rect">
             <a:avLst/>
@@ -2135,6 +2136,257 @@
 </p:sld>
 </file>
 
+<file path=ppt/slides/slide12.xml><?xml version="1.0" encoding="utf-8"?>
+<p:sld xmlns:a="http://schemas.openxmlformats.org/drawingml/2006/main" xmlns:p="http://schemas.openxmlformats.org/presentationml/2006/main" xmlns:r="http://schemas.openxmlformats.org/officeDocument/2006/relationships">
+  <p:cSld>
+    <p:spTree>
+      <p:nvGrpSpPr>
+        <p:cNvPr id="1" name=""/>
+        <p:cNvGrpSpPr/>
+        <p:nvPr/>
+      </p:nvGrpSpPr>
+      <p:grpSpPr>
+        <a:xfrm>
+          <a:off x="0" y="0"/>
+          <a:ext cx="0" cy="0"/>
+          <a:chOff x="0" y="0"/>
+          <a:chExt cx="0" cy="0"/>
+        </a:xfrm>
+      </p:grpSpPr>
+      <p:sp>
+        <p:nvSpPr>
+          <p:cNvPr id="71" name="TextShape 1"/>
+          <p:cNvSpPr txBox="1"/>
+          <p:nvPr/>
+        </p:nvSpPr>
+        <p:spPr>
+          <a:xfrm>
+            <a:off x="457200" y="273600"/>
+            <a:ext cx="8229240" cy="1144800"/>
+          </a:xfrm>
+          <a:prstGeom prst="rect">
+            <a:avLst/>
+          </a:prstGeom>
+          <a:noFill/>
+          <a:ln>
+            <a:noFill/>
+          </a:ln>
+        </p:spPr>
+        <p:txBody>
+          <a:bodyPr lIns="0" rIns="0" tIns="0" bIns="0" anchor="ctr"/>
+          <a:p>
+            <a:pPr algn="ctr"/>
+            <a:r>
+              <a:rPr lang="es-MX" sz="4400">
+                <a:latin typeface="Arial"/>
+              </a:rPr>
+              <a:t>Reporte de respaldos</a:t>
+            </a:r>
+            <a:endParaRPr/>
+          </a:p>
+        </p:txBody>
+      </p:sp>
+      <p:sp>
+        <p:nvSpPr>
+          <p:cNvPr id="72" name="TextShape 2"/>
+          <p:cNvSpPr txBox="1"/>
+          <p:nvPr/>
+        </p:nvSpPr>
+        <p:spPr>
+          <a:xfrm>
+            <a:off x="457200" y="1604520"/>
+            <a:ext cx="8229240" cy="3977280"/>
+          </a:xfrm>
+          <a:prstGeom prst="rect">
+            <a:avLst/>
+          </a:prstGeom>
+          <a:noFill/>
+          <a:ln>
+            <a:noFill/>
+          </a:ln>
+        </p:spPr>
+        <p:txBody>
+          <a:bodyPr lIns="0" rIns="0" tIns="0" bIns="0" anchor="ctr"/>
+          <a:p>
+            <a:pPr algn="ctr"/>
+            <a:endParaRPr/>
+          </a:p>
+        </p:txBody>
+      </p:sp>
+      <p:graphicFrame>
+        <p:nvGraphicFramePr>
+          <p:cNvPr id="73" name="Table 3"/>
+          <p:cNvGraphicFramePr/>
+          <p:nvPr/>
+        </p:nvGraphicFramePr>
+        <p:xfrm>
+          <a:off x="792000" y="1666440"/>
+          <a:ext cx="7443720" cy="3498840"/>
+        </p:xfrm>
+        <a:graphic>
+          <a:graphicData uri="http://schemas.openxmlformats.org/drawingml/2006/table">
+            <a:tbl>
+              <a:tblPr/>
+              <a:tblGrid>
+                <a:gridCol w="1944360"/>
+                <a:gridCol w="1944360"/>
+                <a:gridCol w="3555000"/>
+              </a:tblGrid>
+              <a:tr h="349920">
+                <a:tc>
+                  <a:txBody>
+                    <a:bodyPr lIns="90000" rIns="90000" tIns="46800" bIns="46800"/>
+                    <a:p>
+                      <a:r>
+                        <a:rPr lang="es-MX">
+                          <a:latin typeface="Arial"/>
+                        </a:rPr>
+                        <a:t>Responsable</a:t>
+                      </a:r>
+                      <a:endParaRPr/>
+                    </a:p>
+                  </a:txBody>
+                  <a:tcPr/>
+                </a:tc>
+                <a:tc>
+                  <a:txBody>
+                    <a:bodyPr lIns="90000" rIns="90000" tIns="46800" bIns="46800"/>
+                    <a:p>
+                      <a:r>
+                        <a:rPr lang="es-MX">
+                          <a:latin typeface="Arial"/>
+                        </a:rPr>
+                        <a:t>Fecha de ejecución</a:t>
+                      </a:r>
+                      <a:endParaRPr/>
+                    </a:p>
+                  </a:txBody>
+                  <a:tcPr/>
+                </a:tc>
+                <a:tc>
+                  <a:txBody>
+                    <a:bodyPr lIns="90000" rIns="90000" tIns="46800" bIns="46800"/>
+                    <a:p>
+                      <a:r>
+                        <a:rPr lang="es-MX">
+                          <a:latin typeface="Arial"/>
+                        </a:rPr>
+                        <a:t>Estado</a:t>
+                      </a:r>
+                      <a:endParaRPr/>
+                    </a:p>
+                  </a:txBody>
+                  <a:tcPr/>
+                </a:tc>
+              </a:tr>
+              <a:tr h="340200">
+                <a:tc>
+                  <a:tcPr/>
+                </a:tc>
+                <a:tc>
+                  <a:tcPr/>
+                </a:tc>
+                <a:tc>
+                  <a:tcPr/>
+                </a:tc>
+              </a:tr>
+              <a:tr h="340200">
+                <a:tc>
+                  <a:tcPr/>
+                </a:tc>
+                <a:tc>
+                  <a:tcPr/>
+                </a:tc>
+                <a:tc>
+                  <a:tcPr/>
+                </a:tc>
+              </a:tr>
+              <a:tr h="340200">
+                <a:tc>
+                  <a:tcPr/>
+                </a:tc>
+                <a:tc>
+                  <a:tcPr/>
+                </a:tc>
+                <a:tc>
+                  <a:tcPr/>
+                </a:tc>
+              </a:tr>
+              <a:tr h="340200">
+                <a:tc>
+                  <a:tcPr/>
+                </a:tc>
+                <a:tc>
+                  <a:tcPr/>
+                </a:tc>
+                <a:tc>
+                  <a:tcPr/>
+                </a:tc>
+              </a:tr>
+              <a:tr h="340200">
+                <a:tc>
+                  <a:tcPr/>
+                </a:tc>
+                <a:tc>
+                  <a:tcPr/>
+                </a:tc>
+                <a:tc>
+                  <a:tcPr/>
+                </a:tc>
+              </a:tr>
+              <a:tr h="340200">
+                <a:tc>
+                  <a:tcPr/>
+                </a:tc>
+                <a:tc>
+                  <a:tcPr/>
+                </a:tc>
+                <a:tc>
+                  <a:tcPr/>
+                </a:tc>
+              </a:tr>
+              <a:tr h="340200">
+                <a:tc>
+                  <a:tcPr/>
+                </a:tc>
+                <a:tc>
+                  <a:tcPr/>
+                </a:tc>
+                <a:tc>
+                  <a:tcPr/>
+                </a:tc>
+              </a:tr>
+              <a:tr h="340200">
+                <a:tc>
+                  <a:tcPr/>
+                </a:tc>
+                <a:tc>
+                  <a:tcPr/>
+                </a:tc>
+                <a:tc>
+                  <a:tcPr/>
+                </a:tc>
+              </a:tr>
+              <a:tr h="340200">
+                <a:tc>
+                  <a:tcPr/>
+                </a:tc>
+                <a:tc>
+                  <a:tcPr/>
+                </a:tc>
+                <a:tc>
+                  <a:tcPr/>
+                </a:tc>
+              </a:tr>
+            </a:tbl>
+          </a:graphicData>
+        </a:graphic>
+      </p:graphicFrame>
+    </p:spTree>
+  </p:cSld>
+</p:sld>
+</file>
+
 <file path=ppt/slides/slide2.xml><?xml version="1.0" encoding="utf-8"?>
 <p:sld xmlns:a="http://schemas.openxmlformats.org/drawingml/2006/main" xmlns:p="http://schemas.openxmlformats.org/presentationml/2006/main" xmlns:r="http://schemas.openxmlformats.org/officeDocument/2006/relationships">
   <p:cSld>
@@ -2161,7 +2413,7 @@
         <p:spPr>
           <a:xfrm>
             <a:off x="457200" y="274680"/>
-            <a:ext cx="8227440" cy="1140840"/>
+            <a:ext cx="8227080" cy="1140480"/>
           </a:xfrm>
           <a:prstGeom prst="rect">
             <a:avLst/>
@@ -2208,7 +2460,7 @@
         <p:spPr>
           <a:xfrm>
             <a:off x="457200" y="1600200"/>
-            <a:ext cx="8227440" cy="4523760"/>
+            <a:ext cx="8227080" cy="4523400"/>
           </a:xfrm>
           <a:prstGeom prst="rect">
             <a:avLst/>
@@ -2233,7 +2485,7 @@
         </p:nvGraphicFramePr>
         <p:xfrm>
           <a:off x="1523880" y="1397160"/>
-          <a:ext cx="6095160" cy="1111680"/>
+          <a:ext cx="6095160" cy="1209240"/>
         </p:xfrm>
         <a:graphic>
           <a:graphicData uri="http://schemas.openxmlformats.org/drawingml/2006/table">
@@ -2409,7 +2661,7 @@
         <p:spPr>
           <a:xfrm>
             <a:off x="457200" y="274680"/>
-            <a:ext cx="8227440" cy="1140840"/>
+            <a:ext cx="8227080" cy="1140480"/>
           </a:xfrm>
           <a:prstGeom prst="rect">
             <a:avLst/>
@@ -2456,7 +2708,7 @@
         <p:spPr>
           <a:xfrm>
             <a:off x="457200" y="1600200"/>
-            <a:ext cx="8227440" cy="4523760"/>
+            <a:ext cx="8227080" cy="4523400"/>
           </a:xfrm>
           <a:prstGeom prst="rect">
             <a:avLst/>
@@ -2572,7 +2824,7 @@
         <p:spPr>
           <a:xfrm>
             <a:off x="457200" y="274680"/>
-            <a:ext cx="8227440" cy="1140840"/>
+            <a:ext cx="8227080" cy="1140480"/>
           </a:xfrm>
           <a:prstGeom prst="rect">
             <a:avLst/>
@@ -2619,7 +2871,7 @@
         <p:spPr>
           <a:xfrm>
             <a:off x="457200" y="1600200"/>
-            <a:ext cx="8227440" cy="4523760"/>
+            <a:ext cx="8227080" cy="4523400"/>
           </a:xfrm>
           <a:prstGeom prst="rect">
             <a:avLst/>
@@ -2645,7 +2897,7 @@
         <p:spPr>
           <a:xfrm>
             <a:off x="5220000" y="1416240"/>
-            <a:ext cx="3167640" cy="2284560"/>
+            <a:ext cx="3167280" cy="2284200"/>
           </a:xfrm>
           <a:prstGeom prst="rect">
             <a:avLst/>
@@ -2785,7 +3037,7 @@
         <p:spPr>
           <a:xfrm>
             <a:off x="457200" y="274680"/>
-            <a:ext cx="8227440" cy="1140840"/>
+            <a:ext cx="8227080" cy="1140480"/>
           </a:xfrm>
           <a:prstGeom prst="rect">
             <a:avLst/>
@@ -2832,7 +3084,7 @@
         <p:spPr>
           <a:xfrm>
             <a:off x="457200" y="1600200"/>
-            <a:ext cx="8227440" cy="4523760"/>
+            <a:ext cx="8227080" cy="4523400"/>
           </a:xfrm>
           <a:prstGeom prst="rect">
             <a:avLst/>
@@ -2858,7 +3110,7 @@
         <p:spPr>
           <a:xfrm>
             <a:off x="5868000" y="1340640"/>
-            <a:ext cx="3077280" cy="1735920"/>
+            <a:ext cx="3076920" cy="1735560"/>
           </a:xfrm>
           <a:prstGeom prst="rect">
             <a:avLst/>
@@ -2982,7 +3234,7 @@
         <p:spPr>
           <a:xfrm>
             <a:off x="457200" y="274680"/>
-            <a:ext cx="8227440" cy="1140840"/>
+            <a:ext cx="8227080" cy="1140480"/>
           </a:xfrm>
           <a:prstGeom prst="rect">
             <a:avLst/>
@@ -3029,7 +3281,7 @@
         <p:spPr>
           <a:xfrm>
             <a:off x="457200" y="1600200"/>
-            <a:ext cx="8227440" cy="4523760"/>
+            <a:ext cx="8227080" cy="4523400"/>
           </a:xfrm>
           <a:prstGeom prst="rect">
             <a:avLst/>
@@ -3055,7 +3307,7 @@
         <p:spPr>
           <a:xfrm>
             <a:off x="6365160" y="1124640"/>
-            <a:ext cx="2286000" cy="3107520"/>
+            <a:ext cx="2285640" cy="3107160"/>
           </a:xfrm>
           <a:prstGeom prst="rect">
             <a:avLst/>
@@ -3195,7 +3447,7 @@
         <p:spPr>
           <a:xfrm>
             <a:off x="457200" y="274680"/>
-            <a:ext cx="8227440" cy="1140840"/>
+            <a:ext cx="8227080" cy="1140480"/>
           </a:xfrm>
           <a:prstGeom prst="rect">
             <a:avLst/>
@@ -3242,7 +3494,7 @@
         <p:spPr>
           <a:xfrm>
             <a:off x="457200" y="1600200"/>
-            <a:ext cx="8227440" cy="4523760"/>
+            <a:ext cx="8227080" cy="4523400"/>
           </a:xfrm>
           <a:prstGeom prst="rect">
             <a:avLst/>
@@ -3268,7 +3520,7 @@
         <p:spPr>
           <a:xfrm>
             <a:off x="6183360" y="1416240"/>
-            <a:ext cx="2501280" cy="2833200"/>
+            <a:ext cx="2500920" cy="2832840"/>
           </a:xfrm>
           <a:prstGeom prst="rect">
             <a:avLst/>
@@ -3416,7 +3668,7 @@
         <p:spPr>
           <a:xfrm>
             <a:off x="457200" y="274680"/>
-            <a:ext cx="8227440" cy="1140840"/>
+            <a:ext cx="8227080" cy="1140480"/>
           </a:xfrm>
           <a:prstGeom prst="rect">
             <a:avLst/>
@@ -3463,7 +3715,7 @@
         <p:spPr>
           <a:xfrm>
             <a:off x="457200" y="1600200"/>
-            <a:ext cx="8227440" cy="4523760"/>
+            <a:ext cx="8227080" cy="4523400"/>
           </a:xfrm>
           <a:prstGeom prst="rect">
             <a:avLst/>
@@ -3489,7 +3741,7 @@
         <p:spPr>
           <a:xfrm>
             <a:off x="6375960" y="1416240"/>
-            <a:ext cx="2286000" cy="3107520"/>
+            <a:ext cx="2285640" cy="3107160"/>
           </a:xfrm>
           <a:prstGeom prst="rect">
             <a:avLst/>
@@ -3629,7 +3881,7 @@
         <p:spPr>
           <a:xfrm>
             <a:off x="457200" y="274680"/>
-            <a:ext cx="8227440" cy="1140840"/>
+            <a:ext cx="8227080" cy="1140480"/>
           </a:xfrm>
           <a:prstGeom prst="rect">
             <a:avLst/>
@@ -3676,7 +3928,7 @@
         <p:spPr>
           <a:xfrm>
             <a:off x="457200" y="1600200"/>
-            <a:ext cx="8227440" cy="4523760"/>
+            <a:ext cx="8227080" cy="4523400"/>
           </a:xfrm>
           <a:prstGeom prst="rect">
             <a:avLst/>
@@ -3702,7 +3954,7 @@
         <p:spPr>
           <a:xfrm>
             <a:off x="6041880" y="1416240"/>
-            <a:ext cx="2645280" cy="2558880"/>
+            <a:ext cx="2644920" cy="2558520"/>
           </a:xfrm>
           <a:prstGeom prst="rect">
             <a:avLst/>

</xml_diff>

<commit_message>
actualizacion archivos planeacion anual
</commit_message>
<xml_diff>
--- a/Organización/Métricas y monitoreo/PTL_Reporte_monitoreo.pptx
+++ b/Organización/Métricas y monitoreo/PTL_Reporte_monitoreo.pptx
@@ -3,20 +3,22 @@
 <p:presentation xmlns:a="http://schemas.openxmlformats.org/drawingml/2006/main" xmlns:p="http://schemas.openxmlformats.org/presentationml/2006/main" xmlns:r="http://schemas.openxmlformats.org/officeDocument/2006/relationships">
   <p:sldMasterIdLst>
     <p:sldMasterId id="2147483648" r:id="rId2"/>
+    <p:sldMasterId id="2147483661" r:id="rId3"/>
   </p:sldMasterIdLst>
   <p:sldIdLst>
-    <p:sldId id="256" r:id="rId3"/>
-    <p:sldId id="257" r:id="rId4"/>
-    <p:sldId id="258" r:id="rId5"/>
-    <p:sldId id="259" r:id="rId6"/>
-    <p:sldId id="260" r:id="rId7"/>
-    <p:sldId id="261" r:id="rId8"/>
-    <p:sldId id="262" r:id="rId9"/>
-    <p:sldId id="263" r:id="rId10"/>
-    <p:sldId id="264" r:id="rId11"/>
-    <p:sldId id="265" r:id="rId12"/>
-    <p:sldId id="266" r:id="rId13"/>
-    <p:sldId id="267" r:id="rId14"/>
+    <p:sldId id="256" r:id="rId4"/>
+    <p:sldId id="257" r:id="rId5"/>
+    <p:sldId id="258" r:id="rId6"/>
+    <p:sldId id="259" r:id="rId7"/>
+    <p:sldId id="260" r:id="rId8"/>
+    <p:sldId id="261" r:id="rId9"/>
+    <p:sldId id="262" r:id="rId10"/>
+    <p:sldId id="263" r:id="rId11"/>
+    <p:sldId id="264" r:id="rId12"/>
+    <p:sldId id="265" r:id="rId13"/>
+    <p:sldId id="266" r:id="rId14"/>
+    <p:sldId id="267" r:id="rId15"/>
+    <p:sldId id="268" r:id="rId16"/>
   </p:sldIdLst>
   <p:sldSz cx="9144000" cy="6858000"/>
   <p:notesSz cx="7772400" cy="10058400"/>
@@ -75,7 +77,7 @@
         <p:spPr>
           <a:xfrm>
             <a:off x="457200" y="273600"/>
-            <a:ext cx="8229240" cy="1144800"/>
+            <a:ext cx="8228880" cy="1144440"/>
           </a:xfrm>
           <a:prstGeom prst="rect">
             <a:avLst/>
@@ -102,7 +104,7 @@
         <p:spPr>
           <a:xfrm>
             <a:off x="457200" y="1604520"/>
-            <a:ext cx="8229240" cy="1896840"/>
+            <a:ext cx="8228880" cy="1896840"/>
           </a:xfrm>
           <a:prstGeom prst="rect">
             <a:avLst/>
@@ -128,7 +130,7 @@
         <p:spPr>
           <a:xfrm>
             <a:off x="457200" y="3682080"/>
-            <a:ext cx="8229240" cy="1896840"/>
+            <a:ext cx="8228880" cy="1896840"/>
           </a:xfrm>
           <a:prstGeom prst="rect">
             <a:avLst/>
@@ -176,7 +178,7 @@
         <p:spPr>
           <a:xfrm>
             <a:off x="457200" y="273600"/>
-            <a:ext cx="8229240" cy="1144800"/>
+            <a:ext cx="8228880" cy="1144440"/>
           </a:xfrm>
           <a:prstGeom prst="rect">
             <a:avLst/>
@@ -203,7 +205,7 @@
         <p:spPr>
           <a:xfrm>
             <a:off x="457200" y="1604520"/>
-            <a:ext cx="4015800" cy="1896840"/>
+            <a:ext cx="4015440" cy="1896840"/>
           </a:xfrm>
           <a:prstGeom prst="rect">
             <a:avLst/>
@@ -228,8 +230,8 @@
         </p:nvSpPr>
         <p:spPr>
           <a:xfrm>
-            <a:off x="4674240" y="1604520"/>
-            <a:ext cx="4015800" cy="1896840"/>
+            <a:off x="4673880" y="1604520"/>
+            <a:ext cx="4015440" cy="1896840"/>
           </a:xfrm>
           <a:prstGeom prst="rect">
             <a:avLst/>
@@ -254,8 +256,8 @@
         </p:nvSpPr>
         <p:spPr>
           <a:xfrm>
-            <a:off x="4674240" y="3682080"/>
-            <a:ext cx="4015800" cy="1896840"/>
+            <a:off x="4673880" y="3682080"/>
+            <a:ext cx="4015440" cy="1896840"/>
           </a:xfrm>
           <a:prstGeom prst="rect">
             <a:avLst/>
@@ -281,7 +283,7 @@
         <p:spPr>
           <a:xfrm>
             <a:off x="457200" y="3682080"/>
-            <a:ext cx="4015800" cy="1896840"/>
+            <a:ext cx="4015440" cy="1896840"/>
           </a:xfrm>
           <a:prstGeom prst="rect">
             <a:avLst/>
@@ -329,7 +331,7 @@
         <p:spPr>
           <a:xfrm>
             <a:off x="457200" y="273600"/>
-            <a:ext cx="8229240" cy="1144800"/>
+            <a:ext cx="8228880" cy="1144440"/>
           </a:xfrm>
           <a:prstGeom prst="rect">
             <a:avLst/>
@@ -356,7 +358,7 @@
         <p:spPr>
           <a:xfrm>
             <a:off x="457200" y="1604520"/>
-            <a:ext cx="8229240" cy="3977280"/>
+            <a:ext cx="8228880" cy="3976920"/>
           </a:xfrm>
           <a:prstGeom prst="rect">
             <a:avLst/>
@@ -382,7 +384,7 @@
         <p:spPr>
           <a:xfrm>
             <a:off x="457200" y="1604520"/>
-            <a:ext cx="8229240" cy="3977280"/>
+            <a:ext cx="8228880" cy="3976920"/>
           </a:xfrm>
           <a:prstGeom prst="rect">
             <a:avLst/>
@@ -407,8 +409,8 @@
         </p:blipFill>
         <p:spPr>
           <a:xfrm>
-            <a:off x="2079000" y="1604520"/>
-            <a:ext cx="4984920" cy="3977280"/>
+            <a:off x="2079360" y="1604160"/>
+            <a:ext cx="4984200" cy="3976920"/>
           </a:xfrm>
           <a:prstGeom prst="rect">
             <a:avLst/>
@@ -430,8 +432,8 @@
         </p:blipFill>
         <p:spPr>
           <a:xfrm>
-            <a:off x="2079000" y="1604520"/>
-            <a:ext cx="4984920" cy="3977280"/>
+            <a:off x="2079360" y="1604160"/>
+            <a:ext cx="4984200" cy="3976920"/>
           </a:xfrm>
           <a:prstGeom prst="rect">
             <a:avLst/>
@@ -441,6 +443,505 @@
           </a:ln>
         </p:spPr>
       </p:pic>
+    </p:spTree>
+  </p:cSld>
+</p:sldLayout>
+</file>
+
+<file path=ppt/slideLayouts/slideLayout13.xml><?xml version="1.0" encoding="utf-8"?>
+<p:sldLayout xmlns:a="http://schemas.openxmlformats.org/drawingml/2006/main" xmlns:p="http://schemas.openxmlformats.org/presentationml/2006/main" xmlns:r="http://schemas.openxmlformats.org/officeDocument/2006/relationships" type="blank" preserve="1">
+  <p:cSld name="Blank Slide">
+    <p:spTree>
+      <p:nvGrpSpPr>
+        <p:cNvPr id="1" name=""/>
+        <p:cNvGrpSpPr/>
+        <p:nvPr/>
+      </p:nvGrpSpPr>
+      <p:grpSpPr>
+        <a:xfrm>
+          <a:off x="0" y="0"/>
+          <a:ext cx="0" cy="0"/>
+          <a:chOff x="0" y="0"/>
+          <a:chExt cx="0" cy="0"/>
+        </a:xfrm>
+      </p:grpSpPr>
+    </p:spTree>
+  </p:cSld>
+</p:sldLayout>
+</file>
+
+<file path=ppt/slideLayouts/slideLayout14.xml><?xml version="1.0" encoding="utf-8"?>
+<p:sldLayout xmlns:a="http://schemas.openxmlformats.org/drawingml/2006/main" xmlns:p="http://schemas.openxmlformats.org/presentationml/2006/main" xmlns:r="http://schemas.openxmlformats.org/officeDocument/2006/relationships" type="tx" preserve="1">
+  <p:cSld name="Title Slide">
+    <p:spTree>
+      <p:nvGrpSpPr>
+        <p:cNvPr id="1" name=""/>
+        <p:cNvGrpSpPr/>
+        <p:nvPr/>
+      </p:nvGrpSpPr>
+      <p:grpSpPr>
+        <a:xfrm>
+          <a:off x="0" y="0"/>
+          <a:ext cx="0" cy="0"/>
+          <a:chOff x="0" y="0"/>
+          <a:chExt cx="0" cy="0"/>
+        </a:xfrm>
+      </p:grpSpPr>
+      <p:sp>
+        <p:nvSpPr>
+          <p:cNvPr id="43" name="PlaceHolder 1"/>
+          <p:cNvSpPr>
+            <a:spLocks noGrp="1"/>
+          </p:cNvSpPr>
+          <p:nvPr>
+            <p:ph type="title"/>
+          </p:nvPr>
+        </p:nvSpPr>
+        <p:spPr>
+          <a:xfrm>
+            <a:off x="457200" y="273600"/>
+            <a:ext cx="8228880" cy="1144440"/>
+          </a:xfrm>
+          <a:prstGeom prst="rect">
+            <a:avLst/>
+          </a:prstGeom>
+        </p:spPr>
+        <p:txBody>
+          <a:bodyPr lIns="0" rIns="0" tIns="0" bIns="0" anchor="ctr"/>
+          <a:p>
+            <a:pPr algn="ctr"/>
+            <a:endParaRPr/>
+          </a:p>
+        </p:txBody>
+      </p:sp>
+      <p:sp>
+        <p:nvSpPr>
+          <p:cNvPr id="44" name="PlaceHolder 2"/>
+          <p:cNvSpPr>
+            <a:spLocks noGrp="1"/>
+          </p:cNvSpPr>
+          <p:nvPr>
+            <p:ph type="subTitle"/>
+          </p:nvPr>
+        </p:nvSpPr>
+        <p:spPr>
+          <a:xfrm>
+            <a:off x="457200" y="1604520"/>
+            <a:ext cx="8228880" cy="3976920"/>
+          </a:xfrm>
+          <a:prstGeom prst="rect">
+            <a:avLst/>
+          </a:prstGeom>
+        </p:spPr>
+        <p:txBody>
+          <a:bodyPr lIns="0" rIns="0" tIns="0" bIns="0" anchor="ctr"/>
+          <a:p>
+            <a:pPr algn="ctr"/>
+            <a:endParaRPr/>
+          </a:p>
+        </p:txBody>
+      </p:sp>
+    </p:spTree>
+  </p:cSld>
+</p:sldLayout>
+</file>
+
+<file path=ppt/slideLayouts/slideLayout15.xml><?xml version="1.0" encoding="utf-8"?>
+<p:sldLayout xmlns:a="http://schemas.openxmlformats.org/drawingml/2006/main" xmlns:p="http://schemas.openxmlformats.org/presentationml/2006/main" xmlns:r="http://schemas.openxmlformats.org/officeDocument/2006/relationships" type="obj" preserve="1">
+  <p:cSld name="Title, Content">
+    <p:spTree>
+      <p:nvGrpSpPr>
+        <p:cNvPr id="1" name=""/>
+        <p:cNvGrpSpPr/>
+        <p:nvPr/>
+      </p:nvGrpSpPr>
+      <p:grpSpPr>
+        <a:xfrm>
+          <a:off x="0" y="0"/>
+          <a:ext cx="0" cy="0"/>
+          <a:chOff x="0" y="0"/>
+          <a:chExt cx="0" cy="0"/>
+        </a:xfrm>
+      </p:grpSpPr>
+      <p:sp>
+        <p:nvSpPr>
+          <p:cNvPr id="45" name="PlaceHolder 1"/>
+          <p:cNvSpPr>
+            <a:spLocks noGrp="1"/>
+          </p:cNvSpPr>
+          <p:nvPr>
+            <p:ph type="title"/>
+          </p:nvPr>
+        </p:nvSpPr>
+        <p:spPr>
+          <a:xfrm>
+            <a:off x="457200" y="273600"/>
+            <a:ext cx="8228880" cy="1144440"/>
+          </a:xfrm>
+          <a:prstGeom prst="rect">
+            <a:avLst/>
+          </a:prstGeom>
+        </p:spPr>
+        <p:txBody>
+          <a:bodyPr lIns="0" rIns="0" tIns="0" bIns="0" anchor="ctr"/>
+          <a:p>
+            <a:pPr algn="ctr"/>
+            <a:endParaRPr/>
+          </a:p>
+        </p:txBody>
+      </p:sp>
+      <p:sp>
+        <p:nvSpPr>
+          <p:cNvPr id="46" name="PlaceHolder 2"/>
+          <p:cNvSpPr>
+            <a:spLocks noGrp="1"/>
+          </p:cNvSpPr>
+          <p:nvPr>
+            <p:ph type="body"/>
+          </p:nvPr>
+        </p:nvSpPr>
+        <p:spPr>
+          <a:xfrm>
+            <a:off x="457200" y="1604520"/>
+            <a:ext cx="8228880" cy="3976920"/>
+          </a:xfrm>
+          <a:prstGeom prst="rect">
+            <a:avLst/>
+          </a:prstGeom>
+        </p:spPr>
+        <p:txBody>
+          <a:bodyPr lIns="0" rIns="0" tIns="0" bIns="0"/>
+          <a:p>
+            <a:endParaRPr/>
+          </a:p>
+        </p:txBody>
+      </p:sp>
+    </p:spTree>
+  </p:cSld>
+</p:sldLayout>
+</file>
+
+<file path=ppt/slideLayouts/slideLayout16.xml><?xml version="1.0" encoding="utf-8"?>
+<p:sldLayout xmlns:a="http://schemas.openxmlformats.org/drawingml/2006/main" xmlns:p="http://schemas.openxmlformats.org/presentationml/2006/main" xmlns:r="http://schemas.openxmlformats.org/officeDocument/2006/relationships" type="twoObj" preserve="1">
+  <p:cSld name="Title, 2 Content">
+    <p:spTree>
+      <p:nvGrpSpPr>
+        <p:cNvPr id="1" name=""/>
+        <p:cNvGrpSpPr/>
+        <p:nvPr/>
+      </p:nvGrpSpPr>
+      <p:grpSpPr>
+        <a:xfrm>
+          <a:off x="0" y="0"/>
+          <a:ext cx="0" cy="0"/>
+          <a:chOff x="0" y="0"/>
+          <a:chExt cx="0" cy="0"/>
+        </a:xfrm>
+      </p:grpSpPr>
+      <p:sp>
+        <p:nvSpPr>
+          <p:cNvPr id="47" name="PlaceHolder 1"/>
+          <p:cNvSpPr>
+            <a:spLocks noGrp="1"/>
+          </p:cNvSpPr>
+          <p:nvPr>
+            <p:ph type="title"/>
+          </p:nvPr>
+        </p:nvSpPr>
+        <p:spPr>
+          <a:xfrm>
+            <a:off x="457200" y="273600"/>
+            <a:ext cx="8228880" cy="1144440"/>
+          </a:xfrm>
+          <a:prstGeom prst="rect">
+            <a:avLst/>
+          </a:prstGeom>
+        </p:spPr>
+        <p:txBody>
+          <a:bodyPr lIns="0" rIns="0" tIns="0" bIns="0" anchor="ctr"/>
+          <a:p>
+            <a:pPr algn="ctr"/>
+            <a:endParaRPr/>
+          </a:p>
+        </p:txBody>
+      </p:sp>
+      <p:sp>
+        <p:nvSpPr>
+          <p:cNvPr id="48" name="PlaceHolder 2"/>
+          <p:cNvSpPr>
+            <a:spLocks noGrp="1"/>
+          </p:cNvSpPr>
+          <p:nvPr>
+            <p:ph type="body"/>
+          </p:nvPr>
+        </p:nvSpPr>
+        <p:spPr>
+          <a:xfrm>
+            <a:off x="457200" y="1604520"/>
+            <a:ext cx="4015440" cy="3976920"/>
+          </a:xfrm>
+          <a:prstGeom prst="rect">
+            <a:avLst/>
+          </a:prstGeom>
+        </p:spPr>
+        <p:txBody>
+          <a:bodyPr lIns="0" rIns="0" tIns="0" bIns="0"/>
+          <a:p>
+            <a:endParaRPr/>
+          </a:p>
+        </p:txBody>
+      </p:sp>
+      <p:sp>
+        <p:nvSpPr>
+          <p:cNvPr id="49" name="PlaceHolder 3"/>
+          <p:cNvSpPr>
+            <a:spLocks noGrp="1"/>
+          </p:cNvSpPr>
+          <p:nvPr>
+            <p:ph type="body"/>
+          </p:nvPr>
+        </p:nvSpPr>
+        <p:spPr>
+          <a:xfrm>
+            <a:off x="4673880" y="1604520"/>
+            <a:ext cx="4015440" cy="3976920"/>
+          </a:xfrm>
+          <a:prstGeom prst="rect">
+            <a:avLst/>
+          </a:prstGeom>
+        </p:spPr>
+        <p:txBody>
+          <a:bodyPr lIns="0" rIns="0" tIns="0" bIns="0"/>
+          <a:p>
+            <a:endParaRPr/>
+          </a:p>
+        </p:txBody>
+      </p:sp>
+    </p:spTree>
+  </p:cSld>
+</p:sldLayout>
+</file>
+
+<file path=ppt/slideLayouts/slideLayout17.xml><?xml version="1.0" encoding="utf-8"?>
+<p:sldLayout xmlns:a="http://schemas.openxmlformats.org/drawingml/2006/main" xmlns:p="http://schemas.openxmlformats.org/presentationml/2006/main" xmlns:r="http://schemas.openxmlformats.org/officeDocument/2006/relationships" type="titleOnly" preserve="1">
+  <p:cSld name="Title Only">
+    <p:spTree>
+      <p:nvGrpSpPr>
+        <p:cNvPr id="1" name=""/>
+        <p:cNvGrpSpPr/>
+        <p:nvPr/>
+      </p:nvGrpSpPr>
+      <p:grpSpPr>
+        <a:xfrm>
+          <a:off x="0" y="0"/>
+          <a:ext cx="0" cy="0"/>
+          <a:chOff x="0" y="0"/>
+          <a:chExt cx="0" cy="0"/>
+        </a:xfrm>
+      </p:grpSpPr>
+      <p:sp>
+        <p:nvSpPr>
+          <p:cNvPr id="50" name="PlaceHolder 1"/>
+          <p:cNvSpPr>
+            <a:spLocks noGrp="1"/>
+          </p:cNvSpPr>
+          <p:nvPr>
+            <p:ph type="title"/>
+          </p:nvPr>
+        </p:nvSpPr>
+        <p:spPr>
+          <a:xfrm>
+            <a:off x="457200" y="273600"/>
+            <a:ext cx="8228880" cy="1144440"/>
+          </a:xfrm>
+          <a:prstGeom prst="rect">
+            <a:avLst/>
+          </a:prstGeom>
+        </p:spPr>
+        <p:txBody>
+          <a:bodyPr lIns="0" rIns="0" tIns="0" bIns="0" anchor="ctr"/>
+          <a:p>
+            <a:pPr algn="ctr"/>
+            <a:endParaRPr/>
+          </a:p>
+        </p:txBody>
+      </p:sp>
+    </p:spTree>
+  </p:cSld>
+</p:sldLayout>
+</file>
+
+<file path=ppt/slideLayouts/slideLayout18.xml><?xml version="1.0" encoding="utf-8"?>
+<p:sldLayout xmlns:a="http://schemas.openxmlformats.org/drawingml/2006/main" xmlns:p="http://schemas.openxmlformats.org/presentationml/2006/main" xmlns:r="http://schemas.openxmlformats.org/officeDocument/2006/relationships" type="objOnly" preserve="1">
+  <p:cSld name="Centered Text">
+    <p:spTree>
+      <p:nvGrpSpPr>
+        <p:cNvPr id="1" name=""/>
+        <p:cNvGrpSpPr/>
+        <p:nvPr/>
+      </p:nvGrpSpPr>
+      <p:grpSpPr>
+        <a:xfrm>
+          <a:off x="0" y="0"/>
+          <a:ext cx="0" cy="0"/>
+          <a:chOff x="0" y="0"/>
+          <a:chExt cx="0" cy="0"/>
+        </a:xfrm>
+      </p:grpSpPr>
+      <p:sp>
+        <p:nvSpPr>
+          <p:cNvPr id="51" name="PlaceHolder 1"/>
+          <p:cNvSpPr>
+            <a:spLocks noGrp="1"/>
+          </p:cNvSpPr>
+          <p:nvPr>
+            <p:ph type="subTitle"/>
+          </p:nvPr>
+        </p:nvSpPr>
+        <p:spPr>
+          <a:xfrm>
+            <a:off x="457200" y="273600"/>
+            <a:ext cx="8228880" cy="5306400"/>
+          </a:xfrm>
+          <a:prstGeom prst="rect">
+            <a:avLst/>
+          </a:prstGeom>
+        </p:spPr>
+        <p:txBody>
+          <a:bodyPr lIns="0" rIns="0" tIns="0" bIns="0" anchor="ctr"/>
+          <a:p>
+            <a:pPr algn="ctr"/>
+            <a:endParaRPr/>
+          </a:p>
+        </p:txBody>
+      </p:sp>
+    </p:spTree>
+  </p:cSld>
+</p:sldLayout>
+</file>
+
+<file path=ppt/slideLayouts/slideLayout19.xml><?xml version="1.0" encoding="utf-8"?>
+<p:sldLayout xmlns:a="http://schemas.openxmlformats.org/drawingml/2006/main" xmlns:p="http://schemas.openxmlformats.org/presentationml/2006/main" xmlns:r="http://schemas.openxmlformats.org/officeDocument/2006/relationships" type="twoObjAndObj" preserve="1">
+  <p:cSld name="Title, 2 Content and Content">
+    <p:spTree>
+      <p:nvGrpSpPr>
+        <p:cNvPr id="1" name=""/>
+        <p:cNvGrpSpPr/>
+        <p:nvPr/>
+      </p:nvGrpSpPr>
+      <p:grpSpPr>
+        <a:xfrm>
+          <a:off x="0" y="0"/>
+          <a:ext cx="0" cy="0"/>
+          <a:chOff x="0" y="0"/>
+          <a:chExt cx="0" cy="0"/>
+        </a:xfrm>
+      </p:grpSpPr>
+      <p:sp>
+        <p:nvSpPr>
+          <p:cNvPr id="52" name="PlaceHolder 1"/>
+          <p:cNvSpPr>
+            <a:spLocks noGrp="1"/>
+          </p:cNvSpPr>
+          <p:nvPr>
+            <p:ph type="title"/>
+          </p:nvPr>
+        </p:nvSpPr>
+        <p:spPr>
+          <a:xfrm>
+            <a:off x="457200" y="273600"/>
+            <a:ext cx="8228880" cy="1144440"/>
+          </a:xfrm>
+          <a:prstGeom prst="rect">
+            <a:avLst/>
+          </a:prstGeom>
+        </p:spPr>
+        <p:txBody>
+          <a:bodyPr lIns="0" rIns="0" tIns="0" bIns="0" anchor="ctr"/>
+          <a:p>
+            <a:pPr algn="ctr"/>
+            <a:endParaRPr/>
+          </a:p>
+        </p:txBody>
+      </p:sp>
+      <p:sp>
+        <p:nvSpPr>
+          <p:cNvPr id="53" name="PlaceHolder 2"/>
+          <p:cNvSpPr>
+            <a:spLocks noGrp="1"/>
+          </p:cNvSpPr>
+          <p:nvPr>
+            <p:ph type="body"/>
+          </p:nvPr>
+        </p:nvSpPr>
+        <p:spPr>
+          <a:xfrm>
+            <a:off x="457200" y="1604520"/>
+            <a:ext cx="4015440" cy="1896840"/>
+          </a:xfrm>
+          <a:prstGeom prst="rect">
+            <a:avLst/>
+          </a:prstGeom>
+        </p:spPr>
+        <p:txBody>
+          <a:bodyPr lIns="0" rIns="0" tIns="0" bIns="0"/>
+          <a:p>
+            <a:endParaRPr/>
+          </a:p>
+        </p:txBody>
+      </p:sp>
+      <p:sp>
+        <p:nvSpPr>
+          <p:cNvPr id="54" name="PlaceHolder 3"/>
+          <p:cNvSpPr>
+            <a:spLocks noGrp="1"/>
+          </p:cNvSpPr>
+          <p:nvPr>
+            <p:ph type="body"/>
+          </p:nvPr>
+        </p:nvSpPr>
+        <p:spPr>
+          <a:xfrm>
+            <a:off x="457200" y="3682080"/>
+            <a:ext cx="4015440" cy="1896840"/>
+          </a:xfrm>
+          <a:prstGeom prst="rect">
+            <a:avLst/>
+          </a:prstGeom>
+        </p:spPr>
+        <p:txBody>
+          <a:bodyPr lIns="0" rIns="0" tIns="0" bIns="0"/>
+          <a:p>
+            <a:endParaRPr/>
+          </a:p>
+        </p:txBody>
+      </p:sp>
+      <p:sp>
+        <p:nvSpPr>
+          <p:cNvPr id="55" name="PlaceHolder 4"/>
+          <p:cNvSpPr>
+            <a:spLocks noGrp="1"/>
+          </p:cNvSpPr>
+          <p:nvPr>
+            <p:ph type="body"/>
+          </p:nvPr>
+        </p:nvSpPr>
+        <p:spPr>
+          <a:xfrm>
+            <a:off x="4673880" y="1604520"/>
+            <a:ext cx="4015440" cy="3976920"/>
+          </a:xfrm>
+          <a:prstGeom prst="rect">
+            <a:avLst/>
+          </a:prstGeom>
+        </p:spPr>
+        <p:txBody>
+          <a:bodyPr lIns="0" rIns="0" tIns="0" bIns="0"/>
+          <a:p>
+            <a:endParaRPr/>
+          </a:p>
+        </p:txBody>
+      </p:sp>
     </p:spTree>
   </p:cSld>
 </p:sldLayout>
@@ -476,7 +977,7 @@
         <p:spPr>
           <a:xfrm>
             <a:off x="457200" y="273600"/>
-            <a:ext cx="8229240" cy="1144800"/>
+            <a:ext cx="8228880" cy="1144440"/>
           </a:xfrm>
           <a:prstGeom prst="rect">
             <a:avLst/>
@@ -503,7 +1004,7 @@
         <p:spPr>
           <a:xfrm>
             <a:off x="457200" y="1604520"/>
-            <a:ext cx="8229240" cy="3977280"/>
+            <a:ext cx="8228880" cy="3976920"/>
           </a:xfrm>
           <a:prstGeom prst="rect">
             <a:avLst/>
@@ -517,6 +1018,661 @@
           </a:p>
         </p:txBody>
       </p:sp>
+    </p:spTree>
+  </p:cSld>
+</p:sldLayout>
+</file>
+
+<file path=ppt/slideLayouts/slideLayout20.xml><?xml version="1.0" encoding="utf-8"?>
+<p:sldLayout xmlns:a="http://schemas.openxmlformats.org/drawingml/2006/main" xmlns:p="http://schemas.openxmlformats.org/presentationml/2006/main" xmlns:r="http://schemas.openxmlformats.org/officeDocument/2006/relationships" type="objAndTwoObj" preserve="1">
+  <p:cSld name="Title Content and 2 Content">
+    <p:spTree>
+      <p:nvGrpSpPr>
+        <p:cNvPr id="1" name=""/>
+        <p:cNvGrpSpPr/>
+        <p:nvPr/>
+      </p:nvGrpSpPr>
+      <p:grpSpPr>
+        <a:xfrm>
+          <a:off x="0" y="0"/>
+          <a:ext cx="0" cy="0"/>
+          <a:chOff x="0" y="0"/>
+          <a:chExt cx="0" cy="0"/>
+        </a:xfrm>
+      </p:grpSpPr>
+      <p:sp>
+        <p:nvSpPr>
+          <p:cNvPr id="56" name="PlaceHolder 1"/>
+          <p:cNvSpPr>
+            <a:spLocks noGrp="1"/>
+          </p:cNvSpPr>
+          <p:nvPr>
+            <p:ph type="title"/>
+          </p:nvPr>
+        </p:nvSpPr>
+        <p:spPr>
+          <a:xfrm>
+            <a:off x="457200" y="273600"/>
+            <a:ext cx="8228880" cy="1144440"/>
+          </a:xfrm>
+          <a:prstGeom prst="rect">
+            <a:avLst/>
+          </a:prstGeom>
+        </p:spPr>
+        <p:txBody>
+          <a:bodyPr lIns="0" rIns="0" tIns="0" bIns="0" anchor="ctr"/>
+          <a:p>
+            <a:pPr algn="ctr"/>
+            <a:endParaRPr/>
+          </a:p>
+        </p:txBody>
+      </p:sp>
+      <p:sp>
+        <p:nvSpPr>
+          <p:cNvPr id="57" name="PlaceHolder 2"/>
+          <p:cNvSpPr>
+            <a:spLocks noGrp="1"/>
+          </p:cNvSpPr>
+          <p:nvPr>
+            <p:ph type="body"/>
+          </p:nvPr>
+        </p:nvSpPr>
+        <p:spPr>
+          <a:xfrm>
+            <a:off x="457200" y="1604520"/>
+            <a:ext cx="4015440" cy="3976920"/>
+          </a:xfrm>
+          <a:prstGeom prst="rect">
+            <a:avLst/>
+          </a:prstGeom>
+        </p:spPr>
+        <p:txBody>
+          <a:bodyPr lIns="0" rIns="0" tIns="0" bIns="0"/>
+          <a:p>
+            <a:endParaRPr/>
+          </a:p>
+        </p:txBody>
+      </p:sp>
+      <p:sp>
+        <p:nvSpPr>
+          <p:cNvPr id="58" name="PlaceHolder 3"/>
+          <p:cNvSpPr>
+            <a:spLocks noGrp="1"/>
+          </p:cNvSpPr>
+          <p:nvPr>
+            <p:ph type="body"/>
+          </p:nvPr>
+        </p:nvSpPr>
+        <p:spPr>
+          <a:xfrm>
+            <a:off x="4673880" y="1604520"/>
+            <a:ext cx="4015440" cy="1896840"/>
+          </a:xfrm>
+          <a:prstGeom prst="rect">
+            <a:avLst/>
+          </a:prstGeom>
+        </p:spPr>
+        <p:txBody>
+          <a:bodyPr lIns="0" rIns="0" tIns="0" bIns="0"/>
+          <a:p>
+            <a:endParaRPr/>
+          </a:p>
+        </p:txBody>
+      </p:sp>
+      <p:sp>
+        <p:nvSpPr>
+          <p:cNvPr id="59" name="PlaceHolder 4"/>
+          <p:cNvSpPr>
+            <a:spLocks noGrp="1"/>
+          </p:cNvSpPr>
+          <p:nvPr>
+            <p:ph type="body"/>
+          </p:nvPr>
+        </p:nvSpPr>
+        <p:spPr>
+          <a:xfrm>
+            <a:off x="4673880" y="3682080"/>
+            <a:ext cx="4015440" cy="1896840"/>
+          </a:xfrm>
+          <a:prstGeom prst="rect">
+            <a:avLst/>
+          </a:prstGeom>
+        </p:spPr>
+        <p:txBody>
+          <a:bodyPr lIns="0" rIns="0" tIns="0" bIns="0"/>
+          <a:p>
+            <a:endParaRPr/>
+          </a:p>
+        </p:txBody>
+      </p:sp>
+    </p:spTree>
+  </p:cSld>
+</p:sldLayout>
+</file>
+
+<file path=ppt/slideLayouts/slideLayout21.xml><?xml version="1.0" encoding="utf-8"?>
+<p:sldLayout xmlns:a="http://schemas.openxmlformats.org/drawingml/2006/main" xmlns:p="http://schemas.openxmlformats.org/presentationml/2006/main" xmlns:r="http://schemas.openxmlformats.org/officeDocument/2006/relationships" type="twoObjOverTx" preserve="1">
+  <p:cSld name="Title, 2 Content over Content">
+    <p:spTree>
+      <p:nvGrpSpPr>
+        <p:cNvPr id="1" name=""/>
+        <p:cNvGrpSpPr/>
+        <p:nvPr/>
+      </p:nvGrpSpPr>
+      <p:grpSpPr>
+        <a:xfrm>
+          <a:off x="0" y="0"/>
+          <a:ext cx="0" cy="0"/>
+          <a:chOff x="0" y="0"/>
+          <a:chExt cx="0" cy="0"/>
+        </a:xfrm>
+      </p:grpSpPr>
+      <p:sp>
+        <p:nvSpPr>
+          <p:cNvPr id="60" name="PlaceHolder 1"/>
+          <p:cNvSpPr>
+            <a:spLocks noGrp="1"/>
+          </p:cNvSpPr>
+          <p:nvPr>
+            <p:ph type="title"/>
+          </p:nvPr>
+        </p:nvSpPr>
+        <p:spPr>
+          <a:xfrm>
+            <a:off x="457200" y="273600"/>
+            <a:ext cx="8228880" cy="1144440"/>
+          </a:xfrm>
+          <a:prstGeom prst="rect">
+            <a:avLst/>
+          </a:prstGeom>
+        </p:spPr>
+        <p:txBody>
+          <a:bodyPr lIns="0" rIns="0" tIns="0" bIns="0" anchor="ctr"/>
+          <a:p>
+            <a:pPr algn="ctr"/>
+            <a:endParaRPr/>
+          </a:p>
+        </p:txBody>
+      </p:sp>
+      <p:sp>
+        <p:nvSpPr>
+          <p:cNvPr id="61" name="PlaceHolder 2"/>
+          <p:cNvSpPr>
+            <a:spLocks noGrp="1"/>
+          </p:cNvSpPr>
+          <p:nvPr>
+            <p:ph type="body"/>
+          </p:nvPr>
+        </p:nvSpPr>
+        <p:spPr>
+          <a:xfrm>
+            <a:off x="457200" y="1604520"/>
+            <a:ext cx="4015440" cy="1896840"/>
+          </a:xfrm>
+          <a:prstGeom prst="rect">
+            <a:avLst/>
+          </a:prstGeom>
+        </p:spPr>
+        <p:txBody>
+          <a:bodyPr lIns="0" rIns="0" tIns="0" bIns="0"/>
+          <a:p>
+            <a:endParaRPr/>
+          </a:p>
+        </p:txBody>
+      </p:sp>
+      <p:sp>
+        <p:nvSpPr>
+          <p:cNvPr id="62" name="PlaceHolder 3"/>
+          <p:cNvSpPr>
+            <a:spLocks noGrp="1"/>
+          </p:cNvSpPr>
+          <p:nvPr>
+            <p:ph type="body"/>
+          </p:nvPr>
+        </p:nvSpPr>
+        <p:spPr>
+          <a:xfrm>
+            <a:off x="4673880" y="1604520"/>
+            <a:ext cx="4015440" cy="1896840"/>
+          </a:xfrm>
+          <a:prstGeom prst="rect">
+            <a:avLst/>
+          </a:prstGeom>
+        </p:spPr>
+        <p:txBody>
+          <a:bodyPr lIns="0" rIns="0" tIns="0" bIns="0"/>
+          <a:p>
+            <a:endParaRPr/>
+          </a:p>
+        </p:txBody>
+      </p:sp>
+      <p:sp>
+        <p:nvSpPr>
+          <p:cNvPr id="63" name="PlaceHolder 4"/>
+          <p:cNvSpPr>
+            <a:spLocks noGrp="1"/>
+          </p:cNvSpPr>
+          <p:nvPr>
+            <p:ph type="body"/>
+          </p:nvPr>
+        </p:nvSpPr>
+        <p:spPr>
+          <a:xfrm>
+            <a:off x="457200" y="3682080"/>
+            <a:ext cx="8228880" cy="1896840"/>
+          </a:xfrm>
+          <a:prstGeom prst="rect">
+            <a:avLst/>
+          </a:prstGeom>
+        </p:spPr>
+        <p:txBody>
+          <a:bodyPr lIns="0" rIns="0" tIns="0" bIns="0"/>
+          <a:p>
+            <a:endParaRPr/>
+          </a:p>
+        </p:txBody>
+      </p:sp>
+    </p:spTree>
+  </p:cSld>
+</p:sldLayout>
+</file>
+
+<file path=ppt/slideLayouts/slideLayout22.xml><?xml version="1.0" encoding="utf-8"?>
+<p:sldLayout xmlns:a="http://schemas.openxmlformats.org/drawingml/2006/main" xmlns:p="http://schemas.openxmlformats.org/presentationml/2006/main" xmlns:r="http://schemas.openxmlformats.org/officeDocument/2006/relationships" type="objOverTx" preserve="1">
+  <p:cSld name="Title, Content over Content">
+    <p:spTree>
+      <p:nvGrpSpPr>
+        <p:cNvPr id="1" name=""/>
+        <p:cNvGrpSpPr/>
+        <p:nvPr/>
+      </p:nvGrpSpPr>
+      <p:grpSpPr>
+        <a:xfrm>
+          <a:off x="0" y="0"/>
+          <a:ext cx="0" cy="0"/>
+          <a:chOff x="0" y="0"/>
+          <a:chExt cx="0" cy="0"/>
+        </a:xfrm>
+      </p:grpSpPr>
+      <p:sp>
+        <p:nvSpPr>
+          <p:cNvPr id="64" name="PlaceHolder 1"/>
+          <p:cNvSpPr>
+            <a:spLocks noGrp="1"/>
+          </p:cNvSpPr>
+          <p:nvPr>
+            <p:ph type="title"/>
+          </p:nvPr>
+        </p:nvSpPr>
+        <p:spPr>
+          <a:xfrm>
+            <a:off x="457200" y="273600"/>
+            <a:ext cx="8228880" cy="1144440"/>
+          </a:xfrm>
+          <a:prstGeom prst="rect">
+            <a:avLst/>
+          </a:prstGeom>
+        </p:spPr>
+        <p:txBody>
+          <a:bodyPr lIns="0" rIns="0" tIns="0" bIns="0" anchor="ctr"/>
+          <a:p>
+            <a:pPr algn="ctr"/>
+            <a:endParaRPr/>
+          </a:p>
+        </p:txBody>
+      </p:sp>
+      <p:sp>
+        <p:nvSpPr>
+          <p:cNvPr id="65" name="PlaceHolder 2"/>
+          <p:cNvSpPr>
+            <a:spLocks noGrp="1"/>
+          </p:cNvSpPr>
+          <p:nvPr>
+            <p:ph type="body"/>
+          </p:nvPr>
+        </p:nvSpPr>
+        <p:spPr>
+          <a:xfrm>
+            <a:off x="457200" y="1604520"/>
+            <a:ext cx="8228880" cy="1896840"/>
+          </a:xfrm>
+          <a:prstGeom prst="rect">
+            <a:avLst/>
+          </a:prstGeom>
+        </p:spPr>
+        <p:txBody>
+          <a:bodyPr lIns="0" rIns="0" tIns="0" bIns="0"/>
+          <a:p>
+            <a:endParaRPr/>
+          </a:p>
+        </p:txBody>
+      </p:sp>
+      <p:sp>
+        <p:nvSpPr>
+          <p:cNvPr id="66" name="PlaceHolder 3"/>
+          <p:cNvSpPr>
+            <a:spLocks noGrp="1"/>
+          </p:cNvSpPr>
+          <p:nvPr>
+            <p:ph type="body"/>
+          </p:nvPr>
+        </p:nvSpPr>
+        <p:spPr>
+          <a:xfrm>
+            <a:off x="457200" y="3682080"/>
+            <a:ext cx="8228880" cy="1896840"/>
+          </a:xfrm>
+          <a:prstGeom prst="rect">
+            <a:avLst/>
+          </a:prstGeom>
+        </p:spPr>
+        <p:txBody>
+          <a:bodyPr lIns="0" rIns="0" tIns="0" bIns="0"/>
+          <a:p>
+            <a:endParaRPr/>
+          </a:p>
+        </p:txBody>
+      </p:sp>
+    </p:spTree>
+  </p:cSld>
+</p:sldLayout>
+</file>
+
+<file path=ppt/slideLayouts/slideLayout23.xml><?xml version="1.0" encoding="utf-8"?>
+<p:sldLayout xmlns:a="http://schemas.openxmlformats.org/drawingml/2006/main" xmlns:p="http://schemas.openxmlformats.org/presentationml/2006/main" xmlns:r="http://schemas.openxmlformats.org/officeDocument/2006/relationships" type="fourObj" preserve="1">
+  <p:cSld name="Title, 4 Content">
+    <p:spTree>
+      <p:nvGrpSpPr>
+        <p:cNvPr id="1" name=""/>
+        <p:cNvGrpSpPr/>
+        <p:nvPr/>
+      </p:nvGrpSpPr>
+      <p:grpSpPr>
+        <a:xfrm>
+          <a:off x="0" y="0"/>
+          <a:ext cx="0" cy="0"/>
+          <a:chOff x="0" y="0"/>
+          <a:chExt cx="0" cy="0"/>
+        </a:xfrm>
+      </p:grpSpPr>
+      <p:sp>
+        <p:nvSpPr>
+          <p:cNvPr id="67" name="PlaceHolder 1"/>
+          <p:cNvSpPr>
+            <a:spLocks noGrp="1"/>
+          </p:cNvSpPr>
+          <p:nvPr>
+            <p:ph type="title"/>
+          </p:nvPr>
+        </p:nvSpPr>
+        <p:spPr>
+          <a:xfrm>
+            <a:off x="457200" y="273600"/>
+            <a:ext cx="8228880" cy="1144440"/>
+          </a:xfrm>
+          <a:prstGeom prst="rect">
+            <a:avLst/>
+          </a:prstGeom>
+        </p:spPr>
+        <p:txBody>
+          <a:bodyPr lIns="0" rIns="0" tIns="0" bIns="0" anchor="ctr"/>
+          <a:p>
+            <a:pPr algn="ctr"/>
+            <a:endParaRPr/>
+          </a:p>
+        </p:txBody>
+      </p:sp>
+      <p:sp>
+        <p:nvSpPr>
+          <p:cNvPr id="68" name="PlaceHolder 2"/>
+          <p:cNvSpPr>
+            <a:spLocks noGrp="1"/>
+          </p:cNvSpPr>
+          <p:nvPr>
+            <p:ph type="body"/>
+          </p:nvPr>
+        </p:nvSpPr>
+        <p:spPr>
+          <a:xfrm>
+            <a:off x="457200" y="1604520"/>
+            <a:ext cx="4015440" cy="1896840"/>
+          </a:xfrm>
+          <a:prstGeom prst="rect">
+            <a:avLst/>
+          </a:prstGeom>
+        </p:spPr>
+        <p:txBody>
+          <a:bodyPr lIns="0" rIns="0" tIns="0" bIns="0"/>
+          <a:p>
+            <a:endParaRPr/>
+          </a:p>
+        </p:txBody>
+      </p:sp>
+      <p:sp>
+        <p:nvSpPr>
+          <p:cNvPr id="69" name="PlaceHolder 3"/>
+          <p:cNvSpPr>
+            <a:spLocks noGrp="1"/>
+          </p:cNvSpPr>
+          <p:nvPr>
+            <p:ph type="body"/>
+          </p:nvPr>
+        </p:nvSpPr>
+        <p:spPr>
+          <a:xfrm>
+            <a:off x="4673880" y="1604520"/>
+            <a:ext cx="4015440" cy="1896840"/>
+          </a:xfrm>
+          <a:prstGeom prst="rect">
+            <a:avLst/>
+          </a:prstGeom>
+        </p:spPr>
+        <p:txBody>
+          <a:bodyPr lIns="0" rIns="0" tIns="0" bIns="0"/>
+          <a:p>
+            <a:endParaRPr/>
+          </a:p>
+        </p:txBody>
+      </p:sp>
+      <p:sp>
+        <p:nvSpPr>
+          <p:cNvPr id="70" name="PlaceHolder 4"/>
+          <p:cNvSpPr>
+            <a:spLocks noGrp="1"/>
+          </p:cNvSpPr>
+          <p:nvPr>
+            <p:ph type="body"/>
+          </p:nvPr>
+        </p:nvSpPr>
+        <p:spPr>
+          <a:xfrm>
+            <a:off x="4673880" y="3682080"/>
+            <a:ext cx="4015440" cy="1896840"/>
+          </a:xfrm>
+          <a:prstGeom prst="rect">
+            <a:avLst/>
+          </a:prstGeom>
+        </p:spPr>
+        <p:txBody>
+          <a:bodyPr lIns="0" rIns="0" tIns="0" bIns="0"/>
+          <a:p>
+            <a:endParaRPr/>
+          </a:p>
+        </p:txBody>
+      </p:sp>
+      <p:sp>
+        <p:nvSpPr>
+          <p:cNvPr id="71" name="PlaceHolder 5"/>
+          <p:cNvSpPr>
+            <a:spLocks noGrp="1"/>
+          </p:cNvSpPr>
+          <p:nvPr>
+            <p:ph type="body"/>
+          </p:nvPr>
+        </p:nvSpPr>
+        <p:spPr>
+          <a:xfrm>
+            <a:off x="457200" y="3682080"/>
+            <a:ext cx="4015440" cy="1896840"/>
+          </a:xfrm>
+          <a:prstGeom prst="rect">
+            <a:avLst/>
+          </a:prstGeom>
+        </p:spPr>
+        <p:txBody>
+          <a:bodyPr lIns="0" rIns="0" tIns="0" bIns="0"/>
+          <a:p>
+            <a:endParaRPr/>
+          </a:p>
+        </p:txBody>
+      </p:sp>
+    </p:spTree>
+  </p:cSld>
+</p:sldLayout>
+</file>
+
+<file path=ppt/slideLayouts/slideLayout24.xml><?xml version="1.0" encoding="utf-8"?>
+<p:sldLayout xmlns:a="http://schemas.openxmlformats.org/drawingml/2006/main" xmlns:p="http://schemas.openxmlformats.org/presentationml/2006/main" xmlns:r="http://schemas.openxmlformats.org/officeDocument/2006/relationships" type="blank" preserve="1">
+  <p:cSld name="Title, 6 Content">
+    <p:spTree>
+      <p:nvGrpSpPr>
+        <p:cNvPr id="1" name=""/>
+        <p:cNvGrpSpPr/>
+        <p:nvPr/>
+      </p:nvGrpSpPr>
+      <p:grpSpPr>
+        <a:xfrm>
+          <a:off x="0" y="0"/>
+          <a:ext cx="0" cy="0"/>
+          <a:chOff x="0" y="0"/>
+          <a:chExt cx="0" cy="0"/>
+        </a:xfrm>
+      </p:grpSpPr>
+      <p:sp>
+        <p:nvSpPr>
+          <p:cNvPr id="72" name="PlaceHolder 1"/>
+          <p:cNvSpPr>
+            <a:spLocks noGrp="1"/>
+          </p:cNvSpPr>
+          <p:nvPr>
+            <p:ph type="title"/>
+          </p:nvPr>
+        </p:nvSpPr>
+        <p:spPr>
+          <a:xfrm>
+            <a:off x="457200" y="273600"/>
+            <a:ext cx="8228880" cy="1144440"/>
+          </a:xfrm>
+          <a:prstGeom prst="rect">
+            <a:avLst/>
+          </a:prstGeom>
+        </p:spPr>
+        <p:txBody>
+          <a:bodyPr lIns="0" rIns="0" tIns="0" bIns="0" anchor="ctr"/>
+          <a:p>
+            <a:pPr algn="ctr"/>
+            <a:endParaRPr/>
+          </a:p>
+        </p:txBody>
+      </p:sp>
+      <p:sp>
+        <p:nvSpPr>
+          <p:cNvPr id="73" name="PlaceHolder 2"/>
+          <p:cNvSpPr>
+            <a:spLocks noGrp="1"/>
+          </p:cNvSpPr>
+          <p:nvPr>
+            <p:ph type="body"/>
+          </p:nvPr>
+        </p:nvSpPr>
+        <p:spPr>
+          <a:xfrm>
+            <a:off x="457200" y="1604520"/>
+            <a:ext cx="8228880" cy="3976920"/>
+          </a:xfrm>
+          <a:prstGeom prst="rect">
+            <a:avLst/>
+          </a:prstGeom>
+        </p:spPr>
+        <p:txBody>
+          <a:bodyPr lIns="0" rIns="0" tIns="0" bIns="0"/>
+          <a:p>
+            <a:endParaRPr/>
+          </a:p>
+        </p:txBody>
+      </p:sp>
+      <p:sp>
+        <p:nvSpPr>
+          <p:cNvPr id="74" name="PlaceHolder 3"/>
+          <p:cNvSpPr>
+            <a:spLocks noGrp="1"/>
+          </p:cNvSpPr>
+          <p:nvPr>
+            <p:ph type="body"/>
+          </p:nvPr>
+        </p:nvSpPr>
+        <p:spPr>
+          <a:xfrm>
+            <a:off x="457200" y="1604520"/>
+            <a:ext cx="8228880" cy="3976920"/>
+          </a:xfrm>
+          <a:prstGeom prst="rect">
+            <a:avLst/>
+          </a:prstGeom>
+        </p:spPr>
+        <p:txBody>
+          <a:bodyPr lIns="0" rIns="0" tIns="0" bIns="0"/>
+          <a:p>
+            <a:endParaRPr/>
+          </a:p>
+        </p:txBody>
+      </p:sp>
+      <p:pic>
+        <p:nvPicPr>
+          <p:cNvPr id="75" name="" descr=""/>
+          <p:cNvPicPr/>
+          <p:nvPr/>
+        </p:nvPicPr>
+        <p:blipFill>
+          <a:blip r:embed="rId2"/>
+          <a:stretch/>
+        </p:blipFill>
+        <p:spPr>
+          <a:xfrm>
+            <a:off x="2079360" y="1604160"/>
+            <a:ext cx="4984200" cy="3976920"/>
+          </a:xfrm>
+          <a:prstGeom prst="rect">
+            <a:avLst/>
+          </a:prstGeom>
+          <a:ln>
+            <a:noFill/>
+          </a:ln>
+        </p:spPr>
+      </p:pic>
+      <p:pic>
+        <p:nvPicPr>
+          <p:cNvPr id="76" name="" descr=""/>
+          <p:cNvPicPr/>
+          <p:nvPr/>
+        </p:nvPicPr>
+        <p:blipFill>
+          <a:blip r:embed="rId3"/>
+          <a:stretch/>
+        </p:blipFill>
+        <p:spPr>
+          <a:xfrm>
+            <a:off x="2079360" y="1604160"/>
+            <a:ext cx="4984200" cy="3976920"/>
+          </a:xfrm>
+          <a:prstGeom prst="rect">
+            <a:avLst/>
+          </a:prstGeom>
+          <a:ln>
+            <a:noFill/>
+          </a:ln>
+        </p:spPr>
+      </p:pic>
     </p:spTree>
   </p:cSld>
 </p:sldLayout>
@@ -552,7 +1708,7 @@
         <p:spPr>
           <a:xfrm>
             <a:off x="457200" y="273600"/>
-            <a:ext cx="8229240" cy="1144800"/>
+            <a:ext cx="8228880" cy="1144440"/>
           </a:xfrm>
           <a:prstGeom prst="rect">
             <a:avLst/>
@@ -579,7 +1735,7 @@
         <p:spPr>
           <a:xfrm>
             <a:off x="457200" y="1604520"/>
-            <a:ext cx="8229240" cy="3977280"/>
+            <a:ext cx="8228880" cy="3976920"/>
           </a:xfrm>
           <a:prstGeom prst="rect">
             <a:avLst/>
@@ -627,7 +1783,7 @@
         <p:spPr>
           <a:xfrm>
             <a:off x="457200" y="273600"/>
-            <a:ext cx="8229240" cy="1144800"/>
+            <a:ext cx="8228880" cy="1144440"/>
           </a:xfrm>
           <a:prstGeom prst="rect">
             <a:avLst/>
@@ -654,7 +1810,7 @@
         <p:spPr>
           <a:xfrm>
             <a:off x="457200" y="1604520"/>
-            <a:ext cx="4015800" cy="3977280"/>
+            <a:ext cx="4015440" cy="3976920"/>
           </a:xfrm>
           <a:prstGeom prst="rect">
             <a:avLst/>
@@ -679,8 +1835,8 @@
         </p:nvSpPr>
         <p:spPr>
           <a:xfrm>
-            <a:off x="4674240" y="1604520"/>
-            <a:ext cx="4015800" cy="3977280"/>
+            <a:off x="4673880" y="1604520"/>
+            <a:ext cx="4015440" cy="3976920"/>
           </a:xfrm>
           <a:prstGeom prst="rect">
             <a:avLst/>
@@ -728,7 +1884,7 @@
         <p:spPr>
           <a:xfrm>
             <a:off x="457200" y="273600"/>
-            <a:ext cx="8229240" cy="1144800"/>
+            <a:ext cx="8228880" cy="1144440"/>
           </a:xfrm>
           <a:prstGeom prst="rect">
             <a:avLst/>
@@ -777,7 +1933,7 @@
         <p:spPr>
           <a:xfrm>
             <a:off x="457200" y="273600"/>
-            <a:ext cx="8229240" cy="5307840"/>
+            <a:ext cx="8228880" cy="5306400"/>
           </a:xfrm>
           <a:prstGeom prst="rect">
             <a:avLst/>
@@ -826,7 +1982,7 @@
         <p:spPr>
           <a:xfrm>
             <a:off x="457200" y="273600"/>
-            <a:ext cx="8229240" cy="1144800"/>
+            <a:ext cx="8228880" cy="1144440"/>
           </a:xfrm>
           <a:prstGeom prst="rect">
             <a:avLst/>
@@ -853,7 +2009,7 @@
         <p:spPr>
           <a:xfrm>
             <a:off x="457200" y="1604520"/>
-            <a:ext cx="4015800" cy="1896840"/>
+            <a:ext cx="4015440" cy="1896840"/>
           </a:xfrm>
           <a:prstGeom prst="rect">
             <a:avLst/>
@@ -879,7 +2035,7 @@
         <p:spPr>
           <a:xfrm>
             <a:off x="457200" y="3682080"/>
-            <a:ext cx="4015800" cy="1896840"/>
+            <a:ext cx="4015440" cy="1896840"/>
           </a:xfrm>
           <a:prstGeom prst="rect">
             <a:avLst/>
@@ -904,8 +2060,8 @@
         </p:nvSpPr>
         <p:spPr>
           <a:xfrm>
-            <a:off x="4674240" y="1604520"/>
-            <a:ext cx="4015800" cy="3977280"/>
+            <a:off x="4673880" y="1604520"/>
+            <a:ext cx="4015440" cy="3976920"/>
           </a:xfrm>
           <a:prstGeom prst="rect">
             <a:avLst/>
@@ -953,7 +2109,7 @@
         <p:spPr>
           <a:xfrm>
             <a:off x="457200" y="273600"/>
-            <a:ext cx="8229240" cy="1144800"/>
+            <a:ext cx="8228880" cy="1144440"/>
           </a:xfrm>
           <a:prstGeom prst="rect">
             <a:avLst/>
@@ -980,7 +2136,7 @@
         <p:spPr>
           <a:xfrm>
             <a:off x="457200" y="1604520"/>
-            <a:ext cx="4015800" cy="3977280"/>
+            <a:ext cx="4015440" cy="3976920"/>
           </a:xfrm>
           <a:prstGeom prst="rect">
             <a:avLst/>
@@ -1005,8 +2161,8 @@
         </p:nvSpPr>
         <p:spPr>
           <a:xfrm>
-            <a:off x="4674240" y="1604520"/>
-            <a:ext cx="4015800" cy="1896840"/>
+            <a:off x="4673880" y="1604520"/>
+            <a:ext cx="4015440" cy="1896840"/>
           </a:xfrm>
           <a:prstGeom prst="rect">
             <a:avLst/>
@@ -1031,8 +2187,8 @@
         </p:nvSpPr>
         <p:spPr>
           <a:xfrm>
-            <a:off x="4674240" y="3682080"/>
-            <a:ext cx="4015800" cy="1896840"/>
+            <a:off x="4673880" y="3682080"/>
+            <a:ext cx="4015440" cy="1896840"/>
           </a:xfrm>
           <a:prstGeom prst="rect">
             <a:avLst/>
@@ -1080,7 +2236,7 @@
         <p:spPr>
           <a:xfrm>
             <a:off x="457200" y="273600"/>
-            <a:ext cx="8229240" cy="1144800"/>
+            <a:ext cx="8228880" cy="1144440"/>
           </a:xfrm>
           <a:prstGeom prst="rect">
             <a:avLst/>
@@ -1107,7 +2263,7 @@
         <p:spPr>
           <a:xfrm>
             <a:off x="457200" y="1604520"/>
-            <a:ext cx="4015800" cy="1896840"/>
+            <a:ext cx="4015440" cy="1896840"/>
           </a:xfrm>
           <a:prstGeom prst="rect">
             <a:avLst/>
@@ -1132,8 +2288,8 @@
         </p:nvSpPr>
         <p:spPr>
           <a:xfrm>
-            <a:off x="4674240" y="1604520"/>
-            <a:ext cx="4015800" cy="1896840"/>
+            <a:off x="4673880" y="1604520"/>
+            <a:ext cx="4015440" cy="1896840"/>
           </a:xfrm>
           <a:prstGeom prst="rect">
             <a:avLst/>
@@ -1159,7 +2315,7 @@
         <p:spPr>
           <a:xfrm>
             <a:off x="457200" y="3682080"/>
-            <a:ext cx="8229240" cy="1896840"/>
+            <a:ext cx="8228880" cy="1896840"/>
           </a:xfrm>
           <a:prstGeom prst="rect">
             <a:avLst/>
@@ -1213,7 +2369,7 @@
         <p:spPr>
           <a:xfrm>
             <a:off x="777240" y="0"/>
-            <a:ext cx="7542720" cy="379800"/>
+            <a:ext cx="7542360" cy="379440"/>
           </a:xfrm>
           <a:prstGeom prst="rect">
             <a:avLst/>
@@ -1246,7 +2402,7 @@
         <p:spPr>
           <a:xfrm>
             <a:off x="777240" y="6172200"/>
-            <a:ext cx="7542720" cy="26280"/>
+            <a:ext cx="7542360" cy="25920"/>
           </a:xfrm>
           <a:prstGeom prst="rect">
             <a:avLst/>
@@ -1297,7 +2453,7 @@
               <a:rPr lang="es-MX" sz="4400">
                 <a:latin typeface="Arial"/>
               </a:rPr>
-              <a:t>Click to edit the title text format</a:t>
+              <a:t>Pulse para editar el formato del texto de título</a:t>
             </a:r>
             <a:endParaRPr/>
           </a:p>
@@ -1334,7 +2490,7 @@
               <a:rPr lang="es-MX" sz="3200">
                 <a:latin typeface="Arial"/>
               </a:rPr>
-              <a:t>Click to edit the outline text format</a:t>
+              <a:t>Pulse para editar el formato de esquema del texto</a:t>
             </a:r>
             <a:endParaRPr/>
           </a:p>
@@ -1348,7 +2504,7 @@
               <a:rPr lang="es-MX" sz="2800">
                 <a:latin typeface="Arial"/>
               </a:rPr>
-              <a:t>Second Outline Level</a:t>
+              <a:t>Segundo nivel del esquema</a:t>
             </a:r>
             <a:endParaRPr/>
           </a:p>
@@ -1362,7 +2518,7 @@
               <a:rPr lang="es-MX" sz="2400">
                 <a:latin typeface="Arial"/>
               </a:rPr>
-              <a:t>Third Outline Level</a:t>
+              <a:t>Tercer nivel del esquema</a:t>
             </a:r>
             <a:endParaRPr/>
           </a:p>
@@ -1376,7 +2532,7 @@
               <a:rPr lang="es-MX" sz="2000">
                 <a:latin typeface="Arial"/>
               </a:rPr>
-              <a:t>Fourth Outline Level</a:t>
+              <a:t>Cuarto nivel del esquema</a:t>
             </a:r>
             <a:endParaRPr/>
           </a:p>
@@ -1390,7 +2546,7 @@
               <a:rPr lang="es-MX" sz="2000">
                 <a:latin typeface="Arial"/>
               </a:rPr>
-              <a:t>Fifth Outline Level</a:t>
+              <a:t>Quinto nivel del esquema</a:t>
             </a:r>
             <a:endParaRPr/>
           </a:p>
@@ -1404,7 +2560,7 @@
               <a:rPr lang="es-MX" sz="2000">
                 <a:latin typeface="Arial"/>
               </a:rPr>
-              <a:t>Sixth Outline Level</a:t>
+              <a:t>Sexto nivel del esquema</a:t>
             </a:r>
             <a:endParaRPr/>
           </a:p>
@@ -1418,7 +2574,7 @@
               <a:rPr lang="es-MX" sz="2000">
                 <a:latin typeface="Arial"/>
               </a:rPr>
-              <a:t>Seventh Outline Level</a:t>
+              <a:t>Séptimo nivel del esquema</a:t>
             </a:r>
             <a:endParaRPr/>
           </a:p>
@@ -1440,6 +2596,294 @@
     <p:sldLayoutId id="2147483658" r:id="rId12"/>
     <p:sldLayoutId id="2147483659" r:id="rId13"/>
     <p:sldLayoutId id="2147483660" r:id="rId14"/>
+  </p:sldLayoutIdLst>
+</p:sldMaster>
+</file>
+
+<file path=ppt/slideMasters/slideMaster2.xml><?xml version="1.0" encoding="utf-8"?>
+<p:sldMaster xmlns:a="http://schemas.openxmlformats.org/drawingml/2006/main" xmlns:p="http://schemas.openxmlformats.org/presentationml/2006/main" xmlns:r="http://schemas.openxmlformats.org/officeDocument/2006/relationships">
+  <p:cSld>
+    <p:bg>
+      <p:bgPr>
+        <a:blipFill>
+          <a:blip r:embed="rId2"/>
+          <a:stretch>
+            <a:fillRect/>
+          </a:stretch>
+        </a:blipFill>
+      </p:bgPr>
+    </p:bg>
+    <p:spTree>
+      <p:nvGrpSpPr>
+        <p:cNvPr id="1" name=""/>
+        <p:cNvGrpSpPr/>
+        <p:nvPr/>
+      </p:nvGrpSpPr>
+      <p:grpSpPr>
+        <a:xfrm>
+          <a:off x="0" y="0"/>
+          <a:ext cx="0" cy="0"/>
+          <a:chOff x="0" y="0"/>
+          <a:chExt cx="0" cy="0"/>
+        </a:xfrm>
+      </p:grpSpPr>
+      <p:sp>
+        <p:nvSpPr>
+          <p:cNvPr id="38" name="CustomShape 1"/>
+          <p:cNvSpPr/>
+          <p:nvPr/>
+        </p:nvSpPr>
+        <p:spPr>
+          <a:xfrm>
+            <a:off x="777240" y="0"/>
+            <a:ext cx="7542360" cy="379440"/>
+          </a:xfrm>
+          <a:prstGeom prst="rect">
+            <a:avLst/>
+          </a:prstGeom>
+          <a:ln>
+            <a:noFill/>
+          </a:ln>
+        </p:spPr>
+        <p:style>
+          <a:lnRef idx="2">
+            <a:schemeClr val="accent1">
+              <a:shade val="50000"/>
+            </a:schemeClr>
+          </a:lnRef>
+          <a:fillRef idx="1">
+            <a:schemeClr val="accent1"/>
+          </a:fillRef>
+          <a:effectRef idx="0">
+            <a:schemeClr val="accent1"/>
+          </a:effectRef>
+          <a:fontRef idx="minor"/>
+        </p:style>
+      </p:sp>
+      <p:sp>
+        <p:nvSpPr>
+          <p:cNvPr id="39" name="CustomShape 2"/>
+          <p:cNvSpPr/>
+          <p:nvPr/>
+        </p:nvSpPr>
+        <p:spPr>
+          <a:xfrm>
+            <a:off x="777240" y="6172200"/>
+            <a:ext cx="7542360" cy="25920"/>
+          </a:xfrm>
+          <a:prstGeom prst="rect">
+            <a:avLst/>
+          </a:prstGeom>
+          <a:ln>
+            <a:noFill/>
+          </a:ln>
+        </p:spPr>
+        <p:style>
+          <a:lnRef idx="2">
+            <a:schemeClr val="accent1">
+              <a:shade val="50000"/>
+            </a:schemeClr>
+          </a:lnRef>
+          <a:fillRef idx="1">
+            <a:schemeClr val="accent1"/>
+          </a:fillRef>
+          <a:effectRef idx="0">
+            <a:schemeClr val="accent1"/>
+          </a:effectRef>
+          <a:fontRef idx="minor"/>
+        </p:style>
+      </p:sp>
+      <p:sp>
+        <p:nvSpPr>
+          <p:cNvPr id="40" name="PlaceHolder 3"/>
+          <p:cNvSpPr>
+            <a:spLocks noGrp="1"/>
+          </p:cNvSpPr>
+          <p:nvPr>
+            <p:ph type="title"/>
+          </p:nvPr>
+        </p:nvSpPr>
+        <p:spPr>
+          <a:xfrm>
+            <a:off x="457200" y="273600"/>
+            <a:ext cx="8228880" cy="1144440"/>
+          </a:xfrm>
+          <a:prstGeom prst="rect">
+            <a:avLst/>
+          </a:prstGeom>
+        </p:spPr>
+        <p:txBody>
+          <a:bodyPr lIns="0" rIns="0" tIns="0" bIns="0" anchor="ctr"/>
+          <a:p>
+            <a:pPr algn="ctr"/>
+            <a:endParaRPr/>
+          </a:p>
+        </p:txBody>
+      </p:sp>
+      <p:sp>
+        <p:nvSpPr>
+          <p:cNvPr id="41" name="PlaceHolder 4"/>
+          <p:cNvSpPr>
+            <a:spLocks noGrp="1"/>
+          </p:cNvSpPr>
+          <p:nvPr>
+            <p:ph type="subTitle"/>
+          </p:nvPr>
+        </p:nvSpPr>
+        <p:spPr>
+          <a:xfrm>
+            <a:off x="457200" y="1604520"/>
+            <a:ext cx="8228880" cy="3976920"/>
+          </a:xfrm>
+          <a:prstGeom prst="rect">
+            <a:avLst/>
+          </a:prstGeom>
+        </p:spPr>
+        <p:txBody>
+          <a:bodyPr lIns="0" rIns="0" tIns="0" bIns="0" anchor="ctr"/>
+          <a:p>
+            <a:pPr algn="ctr"/>
+            <a:endParaRPr/>
+          </a:p>
+        </p:txBody>
+      </p:sp>
+      <p:sp>
+        <p:nvSpPr>
+          <p:cNvPr id="42" name="PlaceHolder 5"/>
+          <p:cNvSpPr>
+            <a:spLocks noGrp="1"/>
+          </p:cNvSpPr>
+          <p:nvPr>
+            <p:ph type="body"/>
+          </p:nvPr>
+        </p:nvSpPr>
+        <p:spPr>
+          <a:xfrm>
+            <a:off x="457200" y="1604520"/>
+            <a:ext cx="8229240" cy="3977280"/>
+          </a:xfrm>
+          <a:prstGeom prst="rect">
+            <a:avLst/>
+          </a:prstGeom>
+        </p:spPr>
+        <p:txBody>
+          <a:bodyPr lIns="0" rIns="0" tIns="0" bIns="0"/>
+          <a:p>
+            <a:pPr>
+              <a:buSzPct val="45000"/>
+              <a:buFont typeface="StarSymbol"/>
+              <a:buChar char=""/>
+            </a:pPr>
+            <a:r>
+              <a:rPr lang="es-MX" sz="3200">
+                <a:latin typeface="Arial"/>
+              </a:rPr>
+              <a:t>Pulse para editar el formato de esquema del texto</a:t>
+            </a:r>
+            <a:endParaRPr/>
+          </a:p>
+          <a:p>
+            <a:pPr lvl="1">
+              <a:buSzPct val="75000"/>
+              <a:buFont typeface="StarSymbol"/>
+              <a:buChar char=""/>
+            </a:pPr>
+            <a:r>
+              <a:rPr lang="es-MX" sz="2800">
+                <a:latin typeface="Arial"/>
+              </a:rPr>
+              <a:t>Segundo nivel del esquema</a:t>
+            </a:r>
+            <a:endParaRPr/>
+          </a:p>
+          <a:p>
+            <a:pPr lvl="2">
+              <a:buSzPct val="45000"/>
+              <a:buFont typeface="StarSymbol"/>
+              <a:buChar char=""/>
+            </a:pPr>
+            <a:r>
+              <a:rPr lang="es-MX" sz="2400">
+                <a:latin typeface="Arial"/>
+              </a:rPr>
+              <a:t>Tercer nivel del esquema</a:t>
+            </a:r>
+            <a:endParaRPr/>
+          </a:p>
+          <a:p>
+            <a:pPr lvl="3">
+              <a:buSzPct val="75000"/>
+              <a:buFont typeface="StarSymbol"/>
+              <a:buChar char=""/>
+            </a:pPr>
+            <a:r>
+              <a:rPr lang="es-MX" sz="2000">
+                <a:latin typeface="Arial"/>
+              </a:rPr>
+              <a:t>Cuarto nivel del esquema</a:t>
+            </a:r>
+            <a:endParaRPr/>
+          </a:p>
+          <a:p>
+            <a:pPr lvl="4">
+              <a:buSzPct val="45000"/>
+              <a:buFont typeface="StarSymbol"/>
+              <a:buChar char=""/>
+            </a:pPr>
+            <a:r>
+              <a:rPr lang="es-MX" sz="2000">
+                <a:latin typeface="Arial"/>
+              </a:rPr>
+              <a:t>Quinto nivel del esquema</a:t>
+            </a:r>
+            <a:endParaRPr/>
+          </a:p>
+          <a:p>
+            <a:pPr lvl="5">
+              <a:buSzPct val="45000"/>
+              <a:buFont typeface="StarSymbol"/>
+              <a:buChar char=""/>
+            </a:pPr>
+            <a:r>
+              <a:rPr lang="es-MX" sz="2000">
+                <a:latin typeface="Arial"/>
+              </a:rPr>
+              <a:t>Sexto nivel del esquema</a:t>
+            </a:r>
+            <a:endParaRPr/>
+          </a:p>
+          <a:p>
+            <a:pPr lvl="6">
+              <a:buSzPct val="45000"/>
+              <a:buFont typeface="StarSymbol"/>
+              <a:buChar char=""/>
+            </a:pPr>
+            <a:r>
+              <a:rPr lang="es-MX" sz="2000">
+                <a:latin typeface="Arial"/>
+              </a:rPr>
+              <a:t>Séptimo nivel del esquema</a:t>
+            </a:r>
+            <a:endParaRPr/>
+          </a:p>
+        </p:txBody>
+      </p:sp>
+    </p:spTree>
+  </p:cSld>
+  <p:clrMap bg1="lt1" bg2="lt2" tx1="dk1" tx2="dk2" accent1="accent1" accent2="accent2" accent3="accent3" accent4="accent4" accent5="accent5" accent6="accent6" hlink="hlink" folHlink="folHlink"/>
+  <p:sldLayoutIdLst>
+    <p:sldLayoutId id="2147483662" r:id="rId3"/>
+    <p:sldLayoutId id="2147483663" r:id="rId4"/>
+    <p:sldLayoutId id="2147483664" r:id="rId5"/>
+    <p:sldLayoutId id="2147483665" r:id="rId6"/>
+    <p:sldLayoutId id="2147483666" r:id="rId7"/>
+    <p:sldLayoutId id="2147483667" r:id="rId8"/>
+    <p:sldLayoutId id="2147483668" r:id="rId9"/>
+    <p:sldLayoutId id="2147483669" r:id="rId10"/>
+    <p:sldLayoutId id="2147483670" r:id="rId11"/>
+    <p:sldLayoutId id="2147483671" r:id="rId12"/>
+    <p:sldLayoutId id="2147483672" r:id="rId13"/>
+    <p:sldLayoutId id="2147483673" r:id="rId14"/>
   </p:sldLayoutIdLst>
 </p:sldMaster>
 </file>
@@ -1463,14 +2907,14 @@
       </p:grpSpPr>
       <p:sp>
         <p:nvSpPr>
-          <p:cNvPr id="38" name="CustomShape 1"/>
+          <p:cNvPr id="77" name="CustomShape 1"/>
           <p:cNvSpPr/>
           <p:nvPr/>
         </p:nvSpPr>
         <p:spPr>
           <a:xfrm>
             <a:off x="1012680" y="2282760"/>
-            <a:ext cx="7769880" cy="1467360"/>
+            <a:ext cx="7769520" cy="1467000"/>
           </a:xfrm>
           <a:prstGeom prst="rect">
             <a:avLst/>
@@ -1489,14 +2933,14 @@
       </p:sp>
       <p:sp>
         <p:nvSpPr>
-          <p:cNvPr id="39" name="CustomShape 2"/>
+          <p:cNvPr id="78" name="CustomShape 2"/>
           <p:cNvSpPr/>
           <p:nvPr/>
         </p:nvSpPr>
         <p:spPr>
           <a:xfrm>
             <a:off x="457200" y="501840"/>
-            <a:ext cx="8031600" cy="1143000"/>
+            <a:ext cx="8031240" cy="1142640"/>
           </a:xfrm>
           <a:prstGeom prst="rect">
             <a:avLst/>
@@ -1536,14 +2980,14 @@
       </p:sp>
       <p:sp>
         <p:nvSpPr>
-          <p:cNvPr id="40" name="CustomShape 3"/>
+          <p:cNvPr id="79" name="CustomShape 3"/>
           <p:cNvSpPr/>
           <p:nvPr/>
         </p:nvSpPr>
         <p:spPr>
           <a:xfrm>
             <a:off x="457200" y="1604520"/>
-            <a:ext cx="3924360" cy="3975480"/>
+            <a:ext cx="3924000" cy="3975120"/>
           </a:xfrm>
           <a:prstGeom prst="rect">
             <a:avLst/>
@@ -1647,7 +3091,7 @@
       </p:sp>
       <p:pic>
         <p:nvPicPr>
-          <p:cNvPr id="41" name="Picture 2" descr=""/>
+          <p:cNvPr id="80" name="Picture 2" descr=""/>
           <p:cNvPicPr/>
           <p:nvPr/>
         </p:nvPicPr>
@@ -1658,7 +3102,7 @@
         <p:spPr>
           <a:xfrm>
             <a:off x="6948360" y="1196640"/>
-            <a:ext cx="1913400" cy="1894320"/>
+            <a:ext cx="1913040" cy="1893960"/>
           </a:xfrm>
           <a:prstGeom prst="rect">
             <a:avLst/>
@@ -1729,14 +3173,14 @@
       </p:grpSpPr>
       <p:sp>
         <p:nvSpPr>
-          <p:cNvPr id="65" name="CustomShape 1"/>
+          <p:cNvPr id="104" name="CustomShape 1"/>
           <p:cNvSpPr/>
           <p:nvPr/>
         </p:nvSpPr>
         <p:spPr>
           <a:xfrm>
             <a:off x="457200" y="274680"/>
-            <a:ext cx="8227080" cy="1140480"/>
+            <a:ext cx="8226720" cy="1140120"/>
           </a:xfrm>
           <a:prstGeom prst="rect">
             <a:avLst/>
@@ -1776,14 +3220,14 @@
       </p:sp>
       <p:sp>
         <p:nvSpPr>
-          <p:cNvPr id="66" name="CustomShape 2"/>
+          <p:cNvPr id="105" name="CustomShape 2"/>
           <p:cNvSpPr/>
           <p:nvPr/>
         </p:nvSpPr>
         <p:spPr>
           <a:xfrm>
             <a:off x="457200" y="1600200"/>
-            <a:ext cx="8227080" cy="4523400"/>
+            <a:ext cx="8226720" cy="4523040"/>
           </a:xfrm>
           <a:prstGeom prst="rect">
             <a:avLst/>
@@ -1802,14 +3246,14 @@
       </p:sp>
       <p:sp>
         <p:nvSpPr>
-          <p:cNvPr id="67" name="CustomShape 3"/>
+          <p:cNvPr id="106" name="CustomShape 3"/>
           <p:cNvSpPr/>
           <p:nvPr/>
         </p:nvSpPr>
         <p:spPr>
           <a:xfrm>
             <a:off x="6890760" y="1124640"/>
-            <a:ext cx="1852920" cy="3381480"/>
+            <a:ext cx="1852560" cy="3381120"/>
           </a:xfrm>
           <a:prstGeom prst="rect">
             <a:avLst/>
@@ -1942,14 +3386,14 @@
       </p:grpSpPr>
       <p:sp>
         <p:nvSpPr>
-          <p:cNvPr id="68" name="CustomShape 1"/>
+          <p:cNvPr id="107" name="CustomShape 1"/>
           <p:cNvSpPr/>
           <p:nvPr/>
         </p:nvSpPr>
         <p:spPr>
           <a:xfrm>
             <a:off x="457200" y="274680"/>
-            <a:ext cx="8227080" cy="1140480"/>
+            <a:ext cx="8226720" cy="1140120"/>
           </a:xfrm>
           <a:prstGeom prst="rect">
             <a:avLst/>
@@ -1989,14 +3433,14 @@
       </p:sp>
       <p:sp>
         <p:nvSpPr>
-          <p:cNvPr id="69" name="CustomShape 2"/>
+          <p:cNvPr id="108" name="CustomShape 2"/>
           <p:cNvSpPr/>
           <p:nvPr/>
         </p:nvSpPr>
         <p:spPr>
           <a:xfrm>
             <a:off x="457200" y="1600200"/>
-            <a:ext cx="8227080" cy="4523400"/>
+            <a:ext cx="8226720" cy="4523040"/>
           </a:xfrm>
           <a:prstGeom prst="rect">
             <a:avLst/>
@@ -2015,14 +3459,14 @@
       </p:sp>
       <p:sp>
         <p:nvSpPr>
-          <p:cNvPr id="70" name="CustomShape 3"/>
+          <p:cNvPr id="109" name="CustomShape 3"/>
           <p:cNvSpPr/>
           <p:nvPr/>
         </p:nvSpPr>
         <p:spPr>
           <a:xfrm>
             <a:off x="5751360" y="1412640"/>
-            <a:ext cx="2932920" cy="2284200"/>
+            <a:ext cx="2932560" cy="2283840"/>
           </a:xfrm>
           <a:prstGeom prst="rect">
             <a:avLst/>
@@ -2155,14 +3599,14 @@
       </p:grpSpPr>
       <p:sp>
         <p:nvSpPr>
-          <p:cNvPr id="71" name="TextShape 1"/>
-          <p:cNvSpPr txBox="1"/>
+          <p:cNvPr id="110" name="CustomShape 1"/>
+          <p:cNvSpPr/>
           <p:nvPr/>
         </p:nvSpPr>
         <p:spPr>
           <a:xfrm>
             <a:off x="457200" y="273600"/>
-            <a:ext cx="8229240" cy="1144800"/>
+            <a:ext cx="8228880" cy="1144440"/>
           </a:xfrm>
           <a:prstGeom prst="rect">
             <a:avLst/>
@@ -2172,12 +3616,22 @@
             <a:noFill/>
           </a:ln>
         </p:spPr>
+        <p:style>
+          <a:lnRef idx="0"/>
+          <a:fillRef idx="0"/>
+          <a:effectRef idx="0"/>
+          <a:fontRef idx="minor"/>
+        </p:style>
         <p:txBody>
           <a:bodyPr lIns="0" rIns="0" tIns="0" bIns="0" anchor="ctr"/>
           <a:p>
-            <a:pPr algn="ctr"/>
+            <a:pPr algn="ctr">
+              <a:lnSpc>
+                <a:spcPct val="100000"/>
+              </a:lnSpc>
+            </a:pPr>
             <a:r>
-              <a:rPr lang="es-MX" sz="4400">
+              <a:rPr lang="es-MX" sz="4400" strike="noStrike">
                 <a:latin typeface="Arial"/>
               </a:rPr>
               <a:t>Reporte de respaldos</a:t>
@@ -2188,14 +3642,14 @@
       </p:sp>
       <p:sp>
         <p:nvSpPr>
-          <p:cNvPr id="72" name="TextShape 2"/>
-          <p:cNvSpPr txBox="1"/>
+          <p:cNvPr id="111" name="CustomShape 2"/>
+          <p:cNvSpPr/>
           <p:nvPr/>
         </p:nvSpPr>
         <p:spPr>
           <a:xfrm>
             <a:off x="457200" y="1604520"/>
-            <a:ext cx="8229240" cy="3977280"/>
+            <a:ext cx="8228880" cy="3976920"/>
           </a:xfrm>
           <a:prstGeom prst="rect">
             <a:avLst/>
@@ -2205,23 +3659,22 @@
             <a:noFill/>
           </a:ln>
         </p:spPr>
-        <p:txBody>
-          <a:bodyPr lIns="0" rIns="0" tIns="0" bIns="0" anchor="ctr"/>
-          <a:p>
-            <a:pPr algn="ctr"/>
-            <a:endParaRPr/>
-          </a:p>
-        </p:txBody>
+        <p:style>
+          <a:lnRef idx="0"/>
+          <a:fillRef idx="0"/>
+          <a:effectRef idx="0"/>
+          <a:fontRef idx="minor"/>
+        </p:style>
       </p:sp>
       <p:graphicFrame>
         <p:nvGraphicFramePr>
-          <p:cNvPr id="73" name="Table 3"/>
+          <p:cNvPr id="112" name="Table 3"/>
           <p:cNvGraphicFramePr/>
           <p:nvPr/>
         </p:nvGraphicFramePr>
         <p:xfrm>
           <a:off x="792000" y="1666440"/>
-          <a:ext cx="7443720" cy="3498840"/>
+          <a:ext cx="7443360" cy="3411360"/>
         </p:xfrm>
         <a:graphic>
           <a:graphicData uri="http://schemas.openxmlformats.org/drawingml/2006/table">
@@ -2232,7 +3685,259 @@
                 <a:gridCol w="1944360"/>
                 <a:gridCol w="3555000"/>
               </a:tblGrid>
-              <a:tr h="349920">
+              <a:tr h="603720">
+                <a:tc>
+                  <a:txBody>
+                    <a:bodyPr/>
+                    <a:p>
+                      <a:r>
+                        <a:rPr lang="es-MX" strike="noStrike">
+                          <a:latin typeface="Arial"/>
+                        </a:rPr>
+                        <a:t>Responsable</a:t>
+                      </a:r>
+                      <a:endParaRPr/>
+                    </a:p>
+                  </a:txBody>
+                  <a:tcPr/>
+                </a:tc>
+                <a:tc>
+                  <a:txBody>
+                    <a:bodyPr/>
+                    <a:p>
+                      <a:r>
+                        <a:rPr lang="es-MX" strike="noStrike">
+                          <a:latin typeface="Arial"/>
+                        </a:rPr>
+                        <a:t>Fecha de ejecución</a:t>
+                      </a:r>
+                      <a:endParaRPr/>
+                    </a:p>
+                  </a:txBody>
+                  <a:tcPr/>
+                </a:tc>
+                <a:tc>
+                  <a:txBody>
+                    <a:bodyPr/>
+                    <a:p>
+                      <a:r>
+                        <a:rPr lang="es-MX" strike="noStrike">
+                          <a:latin typeface="Arial"/>
+                        </a:rPr>
+                        <a:t>Estado</a:t>
+                      </a:r>
+                      <a:endParaRPr/>
+                    </a:p>
+                  </a:txBody>
+                  <a:tcPr/>
+                </a:tc>
+              </a:tr>
+              <a:tr h="431640">
+                <a:tc>
+                  <a:tcPr/>
+                </a:tc>
+                <a:tc>
+                  <a:tcPr/>
+                </a:tc>
+                <a:tc>
+                  <a:tcPr/>
+                </a:tc>
+              </a:tr>
+              <a:tr h="431640">
+                <a:tc>
+                  <a:tcPr/>
+                </a:tc>
+                <a:tc>
+                  <a:tcPr/>
+                </a:tc>
+                <a:tc>
+                  <a:tcPr/>
+                </a:tc>
+              </a:tr>
+              <a:tr h="431640">
+                <a:tc>
+                  <a:tcPr/>
+                </a:tc>
+                <a:tc>
+                  <a:tcPr/>
+                </a:tc>
+                <a:tc>
+                  <a:tcPr/>
+                </a:tc>
+              </a:tr>
+              <a:tr h="431640">
+                <a:tc>
+                  <a:tcPr/>
+                </a:tc>
+                <a:tc>
+                  <a:tcPr/>
+                </a:tc>
+                <a:tc>
+                  <a:tcPr/>
+                </a:tc>
+              </a:tr>
+              <a:tr h="431640">
+                <a:tc>
+                  <a:tcPr/>
+                </a:tc>
+                <a:tc>
+                  <a:tcPr/>
+                </a:tc>
+                <a:tc>
+                  <a:tcPr/>
+                </a:tc>
+              </a:tr>
+              <a:tr h="431640">
+                <a:tc>
+                  <a:tcPr/>
+                </a:tc>
+                <a:tc>
+                  <a:tcPr/>
+                </a:tc>
+                <a:tc>
+                  <a:tcPr/>
+                </a:tc>
+              </a:tr>
+              <a:tr h="431640">
+                <a:tc>
+                  <a:tcPr/>
+                </a:tc>
+                <a:tc>
+                  <a:tcPr/>
+                </a:tc>
+                <a:tc>
+                  <a:tcPr/>
+                </a:tc>
+              </a:tr>
+              <a:tr h="431640">
+                <a:tc>
+                  <a:tcPr/>
+                </a:tc>
+                <a:tc>
+                  <a:tcPr/>
+                </a:tc>
+                <a:tc>
+                  <a:tcPr/>
+                </a:tc>
+              </a:tr>
+              <a:tr h="431640">
+                <a:tc>
+                  <a:tcPr/>
+                </a:tc>
+                <a:tc>
+                  <a:tcPr/>
+                </a:tc>
+                <a:tc>
+                  <a:tcPr/>
+                </a:tc>
+              </a:tr>
+            </a:tbl>
+          </a:graphicData>
+        </a:graphic>
+      </p:graphicFrame>
+    </p:spTree>
+  </p:cSld>
+  <p:timing>
+    <p:tnLst>
+      <p:par>
+        <p:cTn id="34" dur="indefinite" restart="never" nodeType="tmRoot">
+          <p:childTnLst>
+            <p:seq>
+              <p:cTn id="35" nodeType="mainSeq"/>
+              <p:prevCondLst>
+                <p:cond delay="0" evt="onPrev">
+                  <p:tgtEl>
+                    <p:sldTgt/>
+                  </p:tgtEl>
+                </p:cond>
+              </p:prevCondLst>
+              <p:nextCondLst>
+                <p:cond delay="0" evt="onNext">
+                  <p:tgtEl>
+                    <p:sldTgt/>
+                  </p:tgtEl>
+                </p:cond>
+              </p:nextCondLst>
+            </p:seq>
+          </p:childTnLst>
+        </p:cTn>
+      </p:par>
+    </p:tnLst>
+  </p:timing>
+</p:sld>
+</file>
+
+<file path=ppt/slides/slide13.xml><?xml version="1.0" encoding="utf-8"?>
+<p:sld xmlns:a="http://schemas.openxmlformats.org/drawingml/2006/main" xmlns:p="http://schemas.openxmlformats.org/presentationml/2006/main" xmlns:r="http://schemas.openxmlformats.org/officeDocument/2006/relationships">
+  <p:cSld>
+    <p:spTree>
+      <p:nvGrpSpPr>
+        <p:cNvPr id="1" name=""/>
+        <p:cNvGrpSpPr/>
+        <p:nvPr/>
+      </p:nvGrpSpPr>
+      <p:grpSpPr>
+        <a:xfrm>
+          <a:off x="0" y="0"/>
+          <a:ext cx="0" cy="0"/>
+          <a:chOff x="0" y="0"/>
+          <a:chExt cx="0" cy="0"/>
+        </a:xfrm>
+      </p:grpSpPr>
+      <p:sp>
+        <p:nvSpPr>
+          <p:cNvPr id="113" name="TextShape 1"/>
+          <p:cNvSpPr txBox="1"/>
+          <p:nvPr/>
+        </p:nvSpPr>
+        <p:spPr>
+          <a:xfrm>
+            <a:off x="457200" y="273600"/>
+            <a:ext cx="8228880" cy="1144440"/>
+          </a:xfrm>
+          <a:prstGeom prst="rect">
+            <a:avLst/>
+          </a:prstGeom>
+          <a:noFill/>
+          <a:ln>
+            <a:noFill/>
+          </a:ln>
+        </p:spPr>
+        <p:txBody>
+          <a:bodyPr lIns="0" rIns="0" tIns="0" bIns="0" anchor="ctr"/>
+          <a:p>
+            <a:pPr algn="ctr"/>
+            <a:r>
+              <a:rPr lang="es-MX" sz="4400">
+                <a:latin typeface="Arial"/>
+              </a:rPr>
+              <a:t>Monitoreo de Riesgos</a:t>
+            </a:r>
+            <a:endParaRPr/>
+          </a:p>
+        </p:txBody>
+      </p:sp>
+      <p:graphicFrame>
+        <p:nvGraphicFramePr>
+          <p:cNvPr id="114" name="Table 2"/>
+          <p:cNvGraphicFramePr/>
+          <p:nvPr/>
+        </p:nvGraphicFramePr>
+        <p:xfrm>
+          <a:off x="457200" y="1604520"/>
+          <a:ext cx="8228520" cy="1360440"/>
+        </p:xfrm>
+        <a:graphic>
+          <a:graphicData uri="http://schemas.openxmlformats.org/drawingml/2006/table">
+            <a:tbl>
+              <a:tblPr/>
+              <a:tblGrid>
+                <a:gridCol w="2057040"/>
+                <a:gridCol w="2057040"/>
+                <a:gridCol w="2057040"/>
+                <a:gridCol w="2057760"/>
+              </a:tblGrid>
+              <a:tr h="340200">
                 <a:tc>
                   <a:txBody>
                     <a:bodyPr lIns="90000" rIns="90000" tIns="46800" bIns="46800"/>
@@ -2241,7 +3946,7 @@
                         <a:rPr lang="es-MX">
                           <a:latin typeface="Arial"/>
                         </a:rPr>
-                        <a:t>Responsable</a:t>
+                        <a:t>Riesgo Presentado</a:t>
                       </a:r>
                       <a:endParaRPr/>
                     </a:p>
@@ -2256,7 +3961,22 @@
                         <a:rPr lang="es-MX">
                           <a:latin typeface="Arial"/>
                         </a:rPr>
-                        <a:t>Fecha de ejecución</a:t>
+                        <a:t>Fecha </a:t>
+                      </a:r>
+                      <a:endParaRPr/>
+                    </a:p>
+                  </a:txBody>
+                  <a:tcPr/>
+                </a:tc>
+                <a:tc>
+                  <a:txBody>
+                    <a:bodyPr lIns="90000" rIns="90000" tIns="46800" bIns="46800"/>
+                    <a:p>
+                      <a:r>
+                        <a:rPr lang="es-MX">
+                          <a:latin typeface="Arial"/>
+                        </a:rPr>
+                        <a:t>Acción </a:t>
                       </a:r>
                       <a:endParaRPr/>
                     </a:p>
@@ -2289,8 +4009,14 @@
                 <a:tc>
                   <a:tcPr/>
                 </a:tc>
+                <a:tc>
+                  <a:tcPr/>
+                </a:tc>
               </a:tr>
               <a:tr h="340200">
+                <a:tc>
+                  <a:tcPr/>
+                </a:tc>
                 <a:tc>
                   <a:tcPr/>
                 </a:tc>
@@ -2305,69 +4031,6 @@
                 <a:tc>
                   <a:tcPr/>
                 </a:tc>
-                <a:tc>
-                  <a:tcPr/>
-                </a:tc>
-                <a:tc>
-                  <a:tcPr/>
-                </a:tc>
-              </a:tr>
-              <a:tr h="340200">
-                <a:tc>
-                  <a:tcPr/>
-                </a:tc>
-                <a:tc>
-                  <a:tcPr/>
-                </a:tc>
-                <a:tc>
-                  <a:tcPr/>
-                </a:tc>
-              </a:tr>
-              <a:tr h="340200">
-                <a:tc>
-                  <a:tcPr/>
-                </a:tc>
-                <a:tc>
-                  <a:tcPr/>
-                </a:tc>
-                <a:tc>
-                  <a:tcPr/>
-                </a:tc>
-              </a:tr>
-              <a:tr h="340200">
-                <a:tc>
-                  <a:tcPr/>
-                </a:tc>
-                <a:tc>
-                  <a:tcPr/>
-                </a:tc>
-                <a:tc>
-                  <a:tcPr/>
-                </a:tc>
-              </a:tr>
-              <a:tr h="340200">
-                <a:tc>
-                  <a:tcPr/>
-                </a:tc>
-                <a:tc>
-                  <a:tcPr/>
-                </a:tc>
-                <a:tc>
-                  <a:tcPr/>
-                </a:tc>
-              </a:tr>
-              <a:tr h="340200">
-                <a:tc>
-                  <a:tcPr/>
-                </a:tc>
-                <a:tc>
-                  <a:tcPr/>
-                </a:tc>
-                <a:tc>
-                  <a:tcPr/>
-                </a:tc>
-              </a:tr>
-              <a:tr h="340200">
                 <a:tc>
                   <a:tcPr/>
                 </a:tc>
@@ -2406,14 +4069,14 @@
       </p:grpSpPr>
       <p:sp>
         <p:nvSpPr>
-          <p:cNvPr id="42" name="CustomShape 1"/>
+          <p:cNvPr id="81" name="CustomShape 1"/>
           <p:cNvSpPr/>
           <p:nvPr/>
         </p:nvSpPr>
         <p:spPr>
           <a:xfrm>
             <a:off x="457200" y="274680"/>
-            <a:ext cx="8227080" cy="1140480"/>
+            <a:ext cx="8226720" cy="1140120"/>
           </a:xfrm>
           <a:prstGeom prst="rect">
             <a:avLst/>
@@ -2453,14 +4116,14 @@
       </p:sp>
       <p:sp>
         <p:nvSpPr>
-          <p:cNvPr id="43" name="CustomShape 2"/>
+          <p:cNvPr id="82" name="CustomShape 2"/>
           <p:cNvSpPr/>
           <p:nvPr/>
         </p:nvSpPr>
         <p:spPr>
           <a:xfrm>
             <a:off x="457200" y="1600200"/>
-            <a:ext cx="8227080" cy="4523400"/>
+            <a:ext cx="8226720" cy="4523040"/>
           </a:xfrm>
           <a:prstGeom prst="rect">
             <a:avLst/>
@@ -2479,7 +4142,7 @@
       </p:sp>
       <p:graphicFrame>
         <p:nvGraphicFramePr>
-          <p:cNvPr id="44" name="Table 3"/>
+          <p:cNvPr id="83" name="Table 3"/>
           <p:cNvGraphicFramePr/>
           <p:nvPr/>
         </p:nvGraphicFramePr>
@@ -2654,14 +4317,14 @@
       </p:grpSpPr>
       <p:sp>
         <p:nvSpPr>
-          <p:cNvPr id="45" name="CustomShape 1"/>
+          <p:cNvPr id="84" name="CustomShape 1"/>
           <p:cNvSpPr/>
           <p:nvPr/>
         </p:nvSpPr>
         <p:spPr>
           <a:xfrm>
             <a:off x="457200" y="274680"/>
-            <a:ext cx="8227080" cy="1140480"/>
+            <a:ext cx="8226720" cy="1140120"/>
           </a:xfrm>
           <a:prstGeom prst="rect">
             <a:avLst/>
@@ -2701,14 +4364,14 @@
       </p:sp>
       <p:sp>
         <p:nvSpPr>
-          <p:cNvPr id="46" name="CustomShape 2"/>
+          <p:cNvPr id="85" name="CustomShape 2"/>
           <p:cNvSpPr/>
           <p:nvPr/>
         </p:nvSpPr>
         <p:spPr>
           <a:xfrm>
             <a:off x="457200" y="1600200"/>
-            <a:ext cx="8227080" cy="4523400"/>
+            <a:ext cx="8226720" cy="4523040"/>
           </a:xfrm>
           <a:prstGeom prst="rect">
             <a:avLst/>
@@ -2817,14 +4480,14 @@
       </p:grpSpPr>
       <p:sp>
         <p:nvSpPr>
-          <p:cNvPr id="47" name="CustomShape 1"/>
+          <p:cNvPr id="86" name="CustomShape 1"/>
           <p:cNvSpPr/>
           <p:nvPr/>
         </p:nvSpPr>
         <p:spPr>
           <a:xfrm>
             <a:off x="457200" y="274680"/>
-            <a:ext cx="8227080" cy="1140480"/>
+            <a:ext cx="8226720" cy="1140120"/>
           </a:xfrm>
           <a:prstGeom prst="rect">
             <a:avLst/>
@@ -2864,14 +4527,14 @@
       </p:sp>
       <p:sp>
         <p:nvSpPr>
-          <p:cNvPr id="48" name="CustomShape 2"/>
+          <p:cNvPr id="87" name="CustomShape 2"/>
           <p:cNvSpPr/>
           <p:nvPr/>
         </p:nvSpPr>
         <p:spPr>
           <a:xfrm>
             <a:off x="457200" y="1600200"/>
-            <a:ext cx="8227080" cy="4523400"/>
+            <a:ext cx="8226720" cy="4523040"/>
           </a:xfrm>
           <a:prstGeom prst="rect">
             <a:avLst/>
@@ -2890,14 +4553,14 @@
       </p:sp>
       <p:sp>
         <p:nvSpPr>
-          <p:cNvPr id="49" name="CustomShape 3"/>
+          <p:cNvPr id="88" name="CustomShape 3"/>
           <p:cNvSpPr/>
           <p:nvPr/>
         </p:nvSpPr>
         <p:spPr>
           <a:xfrm>
             <a:off x="5220000" y="1416240"/>
-            <a:ext cx="3167280" cy="2284200"/>
+            <a:ext cx="3166920" cy="2283840"/>
           </a:xfrm>
           <a:prstGeom prst="rect">
             <a:avLst/>
@@ -3030,14 +4693,14 @@
       </p:grpSpPr>
       <p:sp>
         <p:nvSpPr>
-          <p:cNvPr id="50" name="CustomShape 1"/>
+          <p:cNvPr id="89" name="CustomShape 1"/>
           <p:cNvSpPr/>
           <p:nvPr/>
         </p:nvSpPr>
         <p:spPr>
           <a:xfrm>
             <a:off x="457200" y="274680"/>
-            <a:ext cx="8227080" cy="1140480"/>
+            <a:ext cx="8226720" cy="1140120"/>
           </a:xfrm>
           <a:prstGeom prst="rect">
             <a:avLst/>
@@ -3077,14 +4740,14 @@
       </p:sp>
       <p:sp>
         <p:nvSpPr>
-          <p:cNvPr id="51" name="CustomShape 2"/>
+          <p:cNvPr id="90" name="CustomShape 2"/>
           <p:cNvSpPr/>
           <p:nvPr/>
         </p:nvSpPr>
         <p:spPr>
           <a:xfrm>
             <a:off x="457200" y="1600200"/>
-            <a:ext cx="8227080" cy="4523400"/>
+            <a:ext cx="8226720" cy="4523040"/>
           </a:xfrm>
           <a:prstGeom prst="rect">
             <a:avLst/>
@@ -3103,14 +4766,14 @@
       </p:sp>
       <p:sp>
         <p:nvSpPr>
-          <p:cNvPr id="52" name="CustomShape 3"/>
+          <p:cNvPr id="91" name="CustomShape 3"/>
           <p:cNvSpPr/>
           <p:nvPr/>
         </p:nvSpPr>
         <p:spPr>
           <a:xfrm>
             <a:off x="5868000" y="1340640"/>
-            <a:ext cx="3076920" cy="1735560"/>
+            <a:ext cx="3076560" cy="1735200"/>
           </a:xfrm>
           <a:prstGeom prst="rect">
             <a:avLst/>
@@ -3227,14 +4890,14 @@
       </p:grpSpPr>
       <p:sp>
         <p:nvSpPr>
-          <p:cNvPr id="53" name="CustomShape 1"/>
+          <p:cNvPr id="92" name="CustomShape 1"/>
           <p:cNvSpPr/>
           <p:nvPr/>
         </p:nvSpPr>
         <p:spPr>
           <a:xfrm>
             <a:off x="457200" y="274680"/>
-            <a:ext cx="8227080" cy="1140480"/>
+            <a:ext cx="8226720" cy="1140120"/>
           </a:xfrm>
           <a:prstGeom prst="rect">
             <a:avLst/>
@@ -3274,14 +4937,14 @@
       </p:sp>
       <p:sp>
         <p:nvSpPr>
-          <p:cNvPr id="54" name="CustomShape 2"/>
+          <p:cNvPr id="93" name="CustomShape 2"/>
           <p:cNvSpPr/>
           <p:nvPr/>
         </p:nvSpPr>
         <p:spPr>
           <a:xfrm>
             <a:off x="457200" y="1600200"/>
-            <a:ext cx="8227080" cy="4523400"/>
+            <a:ext cx="8226720" cy="4523040"/>
           </a:xfrm>
           <a:prstGeom prst="rect">
             <a:avLst/>
@@ -3300,14 +4963,14 @@
       </p:sp>
       <p:sp>
         <p:nvSpPr>
-          <p:cNvPr id="55" name="CustomShape 3"/>
+          <p:cNvPr id="94" name="CustomShape 3"/>
           <p:cNvSpPr/>
           <p:nvPr/>
         </p:nvSpPr>
         <p:spPr>
           <a:xfrm>
             <a:off x="6365160" y="1124640"/>
-            <a:ext cx="2285640" cy="3107160"/>
+            <a:ext cx="2285280" cy="3106800"/>
           </a:xfrm>
           <a:prstGeom prst="rect">
             <a:avLst/>
@@ -3440,14 +5103,14 @@
       </p:grpSpPr>
       <p:sp>
         <p:nvSpPr>
-          <p:cNvPr id="56" name="CustomShape 1"/>
+          <p:cNvPr id="95" name="CustomShape 1"/>
           <p:cNvSpPr/>
           <p:nvPr/>
         </p:nvSpPr>
         <p:spPr>
           <a:xfrm>
             <a:off x="457200" y="274680"/>
-            <a:ext cx="8227080" cy="1140480"/>
+            <a:ext cx="8226720" cy="1140120"/>
           </a:xfrm>
           <a:prstGeom prst="rect">
             <a:avLst/>
@@ -3487,14 +5150,14 @@
       </p:sp>
       <p:sp>
         <p:nvSpPr>
-          <p:cNvPr id="57" name="CustomShape 2"/>
+          <p:cNvPr id="96" name="CustomShape 2"/>
           <p:cNvSpPr/>
           <p:nvPr/>
         </p:nvSpPr>
         <p:spPr>
           <a:xfrm>
             <a:off x="457200" y="1600200"/>
-            <a:ext cx="8227080" cy="4523400"/>
+            <a:ext cx="8226720" cy="4523040"/>
           </a:xfrm>
           <a:prstGeom prst="rect">
             <a:avLst/>
@@ -3513,14 +5176,14 @@
       </p:sp>
       <p:sp>
         <p:nvSpPr>
-          <p:cNvPr id="58" name="CustomShape 3"/>
+          <p:cNvPr id="97" name="CustomShape 3"/>
           <p:cNvSpPr/>
           <p:nvPr/>
         </p:nvSpPr>
         <p:spPr>
           <a:xfrm>
             <a:off x="6183360" y="1416240"/>
-            <a:ext cx="2500920" cy="2832840"/>
+            <a:ext cx="2500560" cy="2832480"/>
           </a:xfrm>
           <a:prstGeom prst="rect">
             <a:avLst/>
@@ -3661,14 +5324,14 @@
       </p:grpSpPr>
       <p:sp>
         <p:nvSpPr>
-          <p:cNvPr id="59" name="CustomShape 1"/>
+          <p:cNvPr id="98" name="CustomShape 1"/>
           <p:cNvSpPr/>
           <p:nvPr/>
         </p:nvSpPr>
         <p:spPr>
           <a:xfrm>
             <a:off x="457200" y="274680"/>
-            <a:ext cx="8227080" cy="1140480"/>
+            <a:ext cx="8226720" cy="1140120"/>
           </a:xfrm>
           <a:prstGeom prst="rect">
             <a:avLst/>
@@ -3708,14 +5371,14 @@
       </p:sp>
       <p:sp>
         <p:nvSpPr>
-          <p:cNvPr id="60" name="CustomShape 2"/>
+          <p:cNvPr id="99" name="CustomShape 2"/>
           <p:cNvSpPr/>
           <p:nvPr/>
         </p:nvSpPr>
         <p:spPr>
           <a:xfrm>
             <a:off x="457200" y="1600200"/>
-            <a:ext cx="8227080" cy="4523400"/>
+            <a:ext cx="8226720" cy="4523040"/>
           </a:xfrm>
           <a:prstGeom prst="rect">
             <a:avLst/>
@@ -3734,14 +5397,14 @@
       </p:sp>
       <p:sp>
         <p:nvSpPr>
-          <p:cNvPr id="61" name="CustomShape 3"/>
+          <p:cNvPr id="100" name="CustomShape 3"/>
           <p:cNvSpPr/>
           <p:nvPr/>
         </p:nvSpPr>
         <p:spPr>
           <a:xfrm>
             <a:off x="6375960" y="1416240"/>
-            <a:ext cx="2285640" cy="3107160"/>
+            <a:ext cx="2285280" cy="3106800"/>
           </a:xfrm>
           <a:prstGeom prst="rect">
             <a:avLst/>
@@ -3874,14 +5537,14 @@
       </p:grpSpPr>
       <p:sp>
         <p:nvSpPr>
-          <p:cNvPr id="62" name="CustomShape 1"/>
+          <p:cNvPr id="101" name="CustomShape 1"/>
           <p:cNvSpPr/>
           <p:nvPr/>
         </p:nvSpPr>
         <p:spPr>
           <a:xfrm>
             <a:off x="457200" y="274680"/>
-            <a:ext cx="8227080" cy="1140480"/>
+            <a:ext cx="8226720" cy="1140120"/>
           </a:xfrm>
           <a:prstGeom prst="rect">
             <a:avLst/>
@@ -3921,14 +5584,14 @@
       </p:sp>
       <p:sp>
         <p:nvSpPr>
-          <p:cNvPr id="63" name="CustomShape 2"/>
+          <p:cNvPr id="102" name="CustomShape 2"/>
           <p:cNvSpPr/>
           <p:nvPr/>
         </p:nvSpPr>
         <p:spPr>
           <a:xfrm>
             <a:off x="457200" y="1600200"/>
-            <a:ext cx="8227080" cy="4523400"/>
+            <a:ext cx="8226720" cy="4523040"/>
           </a:xfrm>
           <a:prstGeom prst="rect">
             <a:avLst/>
@@ -3947,14 +5610,14 @@
       </p:sp>
       <p:sp>
         <p:nvSpPr>
-          <p:cNvPr id="64" name="CustomShape 3"/>
+          <p:cNvPr id="103" name="CustomShape 3"/>
           <p:cNvSpPr/>
           <p:nvPr/>
         </p:nvSpPr>
         <p:spPr>
           <a:xfrm>
             <a:off x="6041880" y="1416240"/>
-            <a:ext cx="2644920" cy="2558520"/>
+            <a:ext cx="2644560" cy="2558160"/>
           </a:xfrm>
           <a:prstGeom prst="rect">
             <a:avLst/>
@@ -4289,4 +5952,227 @@
     </a:fmtScheme>
   </a:themeElements>
 </a:theme>
+</file>
+
+<file path=ppt/theme/theme2.xml><?xml version="1.0" encoding="utf-8"?>
+<a:theme xmlns:a="http://schemas.openxmlformats.org/drawingml/2006/main" name="Office Theme">
+  <a:themeElements>
+    <a:clrScheme name="Office">
+      <a:dk1>
+        <a:sysClr val="windowText" lastClr="000000"/>
+      </a:dk1>
+      <a:lt1>
+        <a:sysClr val="window" lastClr="FFFFFF"/>
+      </a:lt1>
+      <a:dk2>
+        <a:srgbClr val="1F497D"/>
+      </a:dk2>
+      <a:lt2>
+        <a:srgbClr val="EEECE1"/>
+      </a:lt2>
+      <a:accent1>
+        <a:srgbClr val="4F81BD"/>
+      </a:accent1>
+      <a:accent2>
+        <a:srgbClr val="C0504D"/>
+      </a:accent2>
+      <a:accent3>
+        <a:srgbClr val="9BBB59"/>
+      </a:accent3>
+      <a:accent4>
+        <a:srgbClr val="8064A2"/>
+      </a:accent4>
+      <a:accent5>
+        <a:srgbClr val="4BACC6"/>
+      </a:accent5>
+      <a:accent6>
+        <a:srgbClr val="F79646"/>
+      </a:accent6>
+      <a:hlink>
+        <a:srgbClr val="0000FF"/>
+      </a:hlink>
+      <a:folHlink>
+        <a:srgbClr val="800080"/>
+      </a:folHlink>
+    </a:clrScheme>
+    <a:fontScheme name="Office">
+      <a:majorFont>
+        <a:latin typeface="Arial"/>
+        <a:ea typeface="DejaVu Sans"/>
+        <a:cs typeface="DejaVu Sans"/>
+      </a:majorFont>
+      <a:minorFont>
+        <a:latin typeface="Arial"/>
+        <a:ea typeface="DejaVu Sans"/>
+        <a:cs typeface="DejaVu Sans"/>
+      </a:minorFont>
+    </a:fontScheme>
+    <a:fmtScheme name="Office">
+      <a:fillStyleLst>
+        <a:solidFill>
+          <a:schemeClr val="phClr"/>
+        </a:solidFill>
+        <a:gradFill rotWithShape="1">
+          <a:gsLst>
+            <a:gs pos="0">
+              <a:schemeClr val="phClr">
+                <a:tint val="50000"/>
+                <a:satMod val="300000"/>
+              </a:schemeClr>
+            </a:gs>
+            <a:gs pos="35000">
+              <a:schemeClr val="phClr">
+                <a:tint val="37000"/>
+                <a:satMod val="300000"/>
+              </a:schemeClr>
+            </a:gs>
+            <a:gs pos="100000">
+              <a:schemeClr val="phClr">
+                <a:tint val="15000"/>
+                <a:satMod val="350000"/>
+              </a:schemeClr>
+            </a:gs>
+          </a:gsLst>
+          <a:lin ang="16200000" scaled="1"/>
+        </a:gradFill>
+        <a:gradFill rotWithShape="1">
+          <a:gsLst>
+            <a:gs pos="0">
+              <a:schemeClr val="phClr">
+                <a:shade val="51000"/>
+                <a:satMod val="130000"/>
+              </a:schemeClr>
+            </a:gs>
+            <a:gs pos="80000">
+              <a:schemeClr val="phClr">
+                <a:shade val="93000"/>
+                <a:satMod val="130000"/>
+              </a:schemeClr>
+            </a:gs>
+            <a:gs pos="100000">
+              <a:schemeClr val="phClr">
+                <a:shade val="94000"/>
+                <a:satMod val="135000"/>
+              </a:schemeClr>
+            </a:gs>
+          </a:gsLst>
+          <a:lin ang="16200000" scaled="0"/>
+        </a:gradFill>
+      </a:fillStyleLst>
+      <a:lnStyleLst>
+        <a:ln w="9525" cap="flat" cmpd="sng" algn="ctr">
+          <a:solidFill>
+            <a:schemeClr val="phClr">
+              <a:shade val="95000"/>
+              <a:satMod val="105000"/>
+            </a:schemeClr>
+          </a:solidFill>
+          <a:prstDash val="solid"/>
+        </a:ln>
+        <a:ln w="25400" cap="flat" cmpd="sng" algn="ctr">
+          <a:solidFill>
+            <a:schemeClr val="phClr"/>
+          </a:solidFill>
+          <a:prstDash val="solid"/>
+        </a:ln>
+        <a:ln w="38100" cap="flat" cmpd="sng" algn="ctr">
+          <a:solidFill>
+            <a:schemeClr val="phClr"/>
+          </a:solidFill>
+          <a:prstDash val="solid"/>
+        </a:ln>
+      </a:lnStyleLst>
+      <a:effectStyleLst>
+        <a:effectStyle>
+          <a:effectLst>
+            <a:outerShdw blurRad="40000" dist="20000" dir="5400000" rotWithShape="0">
+              <a:srgbClr val="000000">
+                <a:alpha val="38000"/>
+              </a:srgbClr>
+            </a:outerShdw>
+          </a:effectLst>
+        </a:effectStyle>
+        <a:effectStyle>
+          <a:effectLst>
+            <a:outerShdw blurRad="40000" dist="23000" dir="5400000" rotWithShape="0">
+              <a:srgbClr val="000000">
+                <a:alpha val="35000"/>
+              </a:srgbClr>
+            </a:outerShdw>
+          </a:effectLst>
+        </a:effectStyle>
+        <a:effectStyle>
+          <a:effectLst>
+            <a:outerShdw blurRad="40000" dist="23000" dir="5400000" rotWithShape="0">
+              <a:srgbClr val="000000">
+                <a:alpha val="35000"/>
+              </a:srgbClr>
+            </a:outerShdw>
+          </a:effectLst>
+          <a:scene3d>
+            <a:camera prst="orthographicFront">
+              <a:rot lat="0" lon="0" rev="0"/>
+            </a:camera>
+            <a:lightRig rig="threePt" dir="t">
+              <a:rot lat="0" lon="0" rev="1200000"/>
+            </a:lightRig>
+          </a:scene3d>
+          <a:sp3d>
+            <a:bevelT w="63500" h="25400"/>
+          </a:sp3d>
+        </a:effectStyle>
+      </a:effectStyleLst>
+      <a:bgFillStyleLst>
+        <a:solidFill>
+          <a:schemeClr val="phClr"/>
+        </a:solidFill>
+        <a:gradFill rotWithShape="1">
+          <a:gsLst>
+            <a:gs pos="0">
+              <a:schemeClr val="phClr">
+                <a:tint val="40000"/>
+                <a:satMod val="350000"/>
+              </a:schemeClr>
+            </a:gs>
+            <a:gs pos="40000">
+              <a:schemeClr val="phClr">
+                <a:tint val="45000"/>
+                <a:shade val="99000"/>
+                <a:satMod val="350000"/>
+              </a:schemeClr>
+            </a:gs>
+            <a:gs pos="100000">
+              <a:schemeClr val="phClr">
+                <a:shade val="20000"/>
+                <a:satMod val="255000"/>
+              </a:schemeClr>
+            </a:gs>
+          </a:gsLst>
+          <a:path path="circle">
+            <a:fillToRect l="50000" t="-80000" r="50000" b="180000"/>
+          </a:path>
+        </a:gradFill>
+        <a:gradFill rotWithShape="1">
+          <a:gsLst>
+            <a:gs pos="0">
+              <a:schemeClr val="phClr">
+                <a:tint val="80000"/>
+                <a:satMod val="300000"/>
+              </a:schemeClr>
+            </a:gs>
+            <a:gs pos="100000">
+              <a:schemeClr val="phClr">
+                <a:shade val="30000"/>
+                <a:satMod val="200000"/>
+              </a:schemeClr>
+            </a:gs>
+          </a:gsLst>
+          <a:path path="circle">
+            <a:fillToRect l="50000" t="50000" r="50000" b="50000"/>
+          </a:path>
+        </a:gradFill>
+      </a:bgFillStyleLst>
+    </a:fmtScheme>
+  </a:themeElements>
+</a:theme>
 </file>
</xml_diff>